<commit_message>
next, we need git repository address add
</commit_message>
<xml_diff>
--- a/Презентация.pptx
+++ b/Презентация.pptx
@@ -11,11 +11,16 @@
     <p:sldId id="259" r:id="rId5"/>
     <p:sldId id="260" r:id="rId6"/>
     <p:sldId id="263" r:id="rId7"/>
-    <p:sldId id="267" r:id="rId8"/>
-    <p:sldId id="264" r:id="rId9"/>
-    <p:sldId id="266" r:id="rId10"/>
+    <p:sldId id="264" r:id="rId8"/>
+    <p:sldId id="266" r:id="rId9"/>
+    <p:sldId id="268" r:id="rId10"/>
     <p:sldId id="265" r:id="rId11"/>
-    <p:sldId id="261" r:id="rId12"/>
+    <p:sldId id="269" r:id="rId12"/>
+    <p:sldId id="270" r:id="rId13"/>
+    <p:sldId id="271" r:id="rId14"/>
+    <p:sldId id="272" r:id="rId15"/>
+    <p:sldId id="273" r:id="rId16"/>
+    <p:sldId id="261" r:id="rId17"/>
   </p:sldIdLst>
   <p:sldSz cx="12192000" cy="6858000"/>
   <p:notesSz cx="6858000" cy="9144000"/>
@@ -115,6 +120,30 @@
     </a:lvl9pPr>
   </p:defaultTextStyle>
   <p:extLst>
+    <p:ext uri="{521415D9-36F7-43E2-AB2F-B90AF26B5E84}">
+      <p14:sectionLst xmlns:p14="http://schemas.microsoft.com/office/powerpoint/2010/main">
+        <p14:section name="Default Section" id="{71E8C573-9E14-F04D-A0FA-0F5E38065F95}">
+          <p14:sldIdLst>
+            <p14:sldId id="256"/>
+            <p14:sldId id="257"/>
+            <p14:sldId id="258"/>
+            <p14:sldId id="259"/>
+            <p14:sldId id="260"/>
+            <p14:sldId id="263"/>
+            <p14:sldId id="264"/>
+            <p14:sldId id="266"/>
+            <p14:sldId id="268"/>
+            <p14:sldId id="265"/>
+            <p14:sldId id="269"/>
+            <p14:sldId id="270"/>
+            <p14:sldId id="271"/>
+            <p14:sldId id="272"/>
+            <p14:sldId id="273"/>
+            <p14:sldId id="261"/>
+          </p14:sldIdLst>
+        </p14:section>
+      </p14:sectionLst>
+    </p:ext>
     <p:ext uri="{EFAFB233-063F-42B5-8137-9DF3F51BA10A}">
       <p15:sldGuideLst xmlns:p15="http://schemas.microsoft.com/office/powerpoint/2012/main"/>
     </p:ext>
@@ -6679,6 +6708,14 @@
 <file path=ppt/slides/slide10.xml><?xml version="1.0" encoding="utf-8"?>
 <p:sld xmlns:a="http://schemas.openxmlformats.org/drawingml/2006/main" xmlns:r="http://schemas.openxmlformats.org/officeDocument/2006/relationships" xmlns:p="http://schemas.openxmlformats.org/presentationml/2006/main">
   <p:cSld>
+    <p:bg>
+      <p:bgPr>
+        <a:solidFill>
+          <a:schemeClr val="bg1"/>
+        </a:solidFill>
+        <a:effectLst/>
+      </p:bgPr>
+    </p:bg>
     <p:spTree>
       <p:nvGrpSpPr>
         <p:cNvPr id="1" name=""/>
@@ -6695,23 +6732,39 @@
       </p:grpSpPr>
       <p:sp>
         <p:nvSpPr>
-          <p:cNvPr id="2" name="타원 1"/>
-          <p:cNvSpPr/>
-          <p:nvPr/>
-        </p:nvSpPr>
-        <p:spPr>
-          <a:xfrm>
-            <a:off x="7402881" y="-816429"/>
-            <a:ext cx="6998919" cy="8870665"/>
-          </a:xfrm>
-          <a:prstGeom prst="ellipse">
+          <p:cNvPr id="37" name="Rectangle 36">
+            <a:extLst>
+              <a:ext uri="{FF2B5EF4-FFF2-40B4-BE49-F238E27FC236}">
+                <a16:creationId xmlns:a16="http://schemas.microsoft.com/office/drawing/2014/main" id="{56827C3C-D52F-46CE-A441-3CD6A1A6A0A2}"/>
+              </a:ext>
+              <a:ext uri="{C183D7F6-B498-43B3-948B-1728B52AA6E4}">
+                <adec:decorative xmlns:adec="http://schemas.microsoft.com/office/drawing/2017/decorative" val="1"/>
+              </a:ext>
+            </a:extLst>
+          </p:cNvPr>
+          <p:cNvSpPr>
+            <a:spLocks noGrp="1" noRot="1" noChangeAspect="1" noMove="1" noResize="1" noEditPoints="1" noAdjustHandles="1" noChangeArrowheads="1" noChangeShapeType="1" noTextEdit="1"/>
+          </p:cNvSpPr>
+          <p:nvPr>
+            <p:extLst>
+              <p:ext uri="{386F3935-93C4-4BCD-93E2-E3B085C9AB24}">
+                <p16:designElem xmlns:p16="http://schemas.microsoft.com/office/powerpoint/2015/main" val="1"/>
+              </p:ext>
+            </p:extLst>
+          </p:nvPr>
+        </p:nvSpPr>
+        <p:spPr>
+          <a:xfrm>
+            <a:off x="3137" y="0"/>
+            <a:ext cx="12192000" cy="6858000"/>
+          </a:xfrm>
+          <a:prstGeom prst="rect">
             <a:avLst/>
           </a:prstGeom>
           <a:solidFill>
-            <a:schemeClr val="bg2">
-              <a:lumMod val="60000"/>
-              <a:lumOff val="40000"/>
-              <a:alpha val="27000"/>
+            <a:schemeClr val="bg1">
+              <a:lumMod val="85000"/>
+              <a:alpha val="90000"/>
             </a:schemeClr>
           </a:solidFill>
           <a:ln>
@@ -6739,10 +6792,310 @@
           <a:lstStyle/>
           <a:p>
             <a:pPr algn="ctr"/>
-            <a:endParaRPr lang="ko-KR" altLang="en-US"/>
-          </a:p>
-        </p:txBody>
-      </p:sp>
+            <a:endParaRPr lang="en-US"/>
+          </a:p>
+        </p:txBody>
+      </p:sp>
+      <p:sp>
+        <p:nvSpPr>
+          <p:cNvPr id="39" name="Rectangle 38">
+            <a:extLst>
+              <a:ext uri="{FF2B5EF4-FFF2-40B4-BE49-F238E27FC236}">
+                <a16:creationId xmlns:a16="http://schemas.microsoft.com/office/drawing/2014/main" id="{F52A8B51-0A89-497B-B882-6658E029A3F9}"/>
+              </a:ext>
+              <a:ext uri="{C183D7F6-B498-43B3-948B-1728B52AA6E4}">
+                <adec:decorative xmlns:adec="http://schemas.microsoft.com/office/drawing/2017/decorative" val="1"/>
+              </a:ext>
+            </a:extLst>
+          </p:cNvPr>
+          <p:cNvSpPr>
+            <a:spLocks noGrp="1" noRot="1" noChangeAspect="1" noMove="1" noResize="1" noEditPoints="1" noAdjustHandles="1" noChangeArrowheads="1" noChangeShapeType="1" noTextEdit="1"/>
+          </p:cNvSpPr>
+          <p:nvPr>
+            <p:extLst>
+              <p:ext uri="{386F3935-93C4-4BCD-93E2-E3B085C9AB24}">
+                <p16:designElem xmlns:p16="http://schemas.microsoft.com/office/powerpoint/2015/main" val="1"/>
+              </p:ext>
+            </p:extLst>
+          </p:nvPr>
+        </p:nvSpPr>
+        <p:spPr>
+          <a:xfrm>
+            <a:off x="643467" y="643466"/>
+            <a:ext cx="3522548" cy="5571067"/>
+          </a:xfrm>
+          <a:prstGeom prst="rect">
+            <a:avLst/>
+          </a:prstGeom>
+          <a:solidFill>
+            <a:srgbClr val="FFFFFF"/>
+          </a:solidFill>
+          <a:ln w="9525">
+            <a:noFill/>
+          </a:ln>
+          <a:effectLst>
+            <a:outerShdw blurRad="63500" dist="17780" dir="5400000" algn="t" rotWithShape="0">
+              <a:prstClr val="black">
+                <a:alpha val="43000"/>
+              </a:prstClr>
+            </a:outerShdw>
+          </a:effectLst>
+        </p:spPr>
+        <p:style>
+          <a:lnRef idx="2">
+            <a:schemeClr val="accent1">
+              <a:shade val="50000"/>
+            </a:schemeClr>
+          </a:lnRef>
+          <a:fillRef idx="1">
+            <a:schemeClr val="accent1"/>
+          </a:fillRef>
+          <a:effectRef idx="0">
+            <a:schemeClr val="accent1"/>
+          </a:effectRef>
+          <a:fontRef idx="minor">
+            <a:schemeClr val="lt1"/>
+          </a:fontRef>
+        </p:style>
+        <p:txBody>
+          <a:bodyPr rtlCol="0" anchor="ctr"/>
+          <a:lstStyle/>
+          <a:p>
+            <a:pPr algn="ctr"/>
+            <a:endParaRPr lang="en-US"/>
+          </a:p>
+        </p:txBody>
+      </p:sp>
+      <p:pic>
+        <p:nvPicPr>
+          <p:cNvPr id="6" name="Picture 5">
+            <a:extLst>
+              <a:ext uri="{FF2B5EF4-FFF2-40B4-BE49-F238E27FC236}">
+                <a16:creationId xmlns:a16="http://schemas.microsoft.com/office/drawing/2014/main" id="{A26BCB0B-E42B-914F-BF5D-3F764CD076F5}"/>
+              </a:ext>
+            </a:extLst>
+          </p:cNvPr>
+          <p:cNvPicPr>
+            <a:picLocks noChangeAspect="1"/>
+          </p:cNvPicPr>
+          <p:nvPr/>
+        </p:nvPicPr>
+        <p:blipFill>
+          <a:blip r:embed="rId2"/>
+          <a:stretch>
+            <a:fillRect/>
+          </a:stretch>
+        </p:blipFill>
+        <p:spPr>
+          <a:xfrm>
+            <a:off x="1579368" y="965199"/>
+            <a:ext cx="1650746" cy="4927601"/>
+          </a:xfrm>
+          <a:prstGeom prst="rect">
+            <a:avLst/>
+          </a:prstGeom>
+        </p:spPr>
+      </p:pic>
+      <p:sp>
+        <p:nvSpPr>
+          <p:cNvPr id="44" name="Rectangle 40">
+            <a:extLst>
+              <a:ext uri="{FF2B5EF4-FFF2-40B4-BE49-F238E27FC236}">
+                <a16:creationId xmlns:a16="http://schemas.microsoft.com/office/drawing/2014/main" id="{EB1CEFBF-6F09-4052-862B-E219DA15757E}"/>
+              </a:ext>
+              <a:ext uri="{C183D7F6-B498-43B3-948B-1728B52AA6E4}">
+                <adec:decorative xmlns:adec="http://schemas.microsoft.com/office/drawing/2017/decorative" val="1"/>
+              </a:ext>
+            </a:extLst>
+          </p:cNvPr>
+          <p:cNvSpPr>
+            <a:spLocks noGrp="1" noRot="1" noChangeAspect="1" noMove="1" noResize="1" noEditPoints="1" noAdjustHandles="1" noChangeArrowheads="1" noChangeShapeType="1" noTextEdit="1"/>
+          </p:cNvSpPr>
+          <p:nvPr>
+            <p:extLst>
+              <p:ext uri="{386F3935-93C4-4BCD-93E2-E3B085C9AB24}">
+                <p16:designElem xmlns:p16="http://schemas.microsoft.com/office/powerpoint/2015/main" val="1"/>
+              </p:ext>
+            </p:extLst>
+          </p:nvPr>
+        </p:nvSpPr>
+        <p:spPr>
+          <a:xfrm>
+            <a:off x="4326882" y="643466"/>
+            <a:ext cx="3522548" cy="5571067"/>
+          </a:xfrm>
+          <a:prstGeom prst="rect">
+            <a:avLst/>
+          </a:prstGeom>
+          <a:solidFill>
+            <a:srgbClr val="FFFFFF"/>
+          </a:solidFill>
+          <a:ln w="9525">
+            <a:noFill/>
+          </a:ln>
+          <a:effectLst>
+            <a:outerShdw blurRad="63500" dist="17780" dir="5400000" algn="t" rotWithShape="0">
+              <a:prstClr val="black">
+                <a:alpha val="43000"/>
+              </a:prstClr>
+            </a:outerShdw>
+          </a:effectLst>
+        </p:spPr>
+        <p:style>
+          <a:lnRef idx="2">
+            <a:schemeClr val="accent1">
+              <a:shade val="50000"/>
+            </a:schemeClr>
+          </a:lnRef>
+          <a:fillRef idx="1">
+            <a:schemeClr val="accent1"/>
+          </a:fillRef>
+          <a:effectRef idx="0">
+            <a:schemeClr val="accent1"/>
+          </a:effectRef>
+          <a:fontRef idx="minor">
+            <a:schemeClr val="lt1"/>
+          </a:fontRef>
+        </p:style>
+        <p:txBody>
+          <a:bodyPr rtlCol="0" anchor="ctr"/>
+          <a:lstStyle/>
+          <a:p>
+            <a:pPr algn="ctr"/>
+            <a:endParaRPr lang="en-US"/>
+          </a:p>
+        </p:txBody>
+      </p:sp>
+      <p:pic>
+        <p:nvPicPr>
+          <p:cNvPr id="4" name="Picture 3">
+            <a:extLst>
+              <a:ext uri="{FF2B5EF4-FFF2-40B4-BE49-F238E27FC236}">
+                <a16:creationId xmlns:a16="http://schemas.microsoft.com/office/drawing/2014/main" id="{66A15A2C-BA73-5540-BAF2-2475C2358809}"/>
+              </a:ext>
+            </a:extLst>
+          </p:cNvPr>
+          <p:cNvPicPr>
+            <a:picLocks noChangeAspect="1"/>
+          </p:cNvPicPr>
+          <p:nvPr/>
+        </p:nvPicPr>
+        <p:blipFill>
+          <a:blip r:embed="rId3"/>
+          <a:stretch>
+            <a:fillRect/>
+          </a:stretch>
+        </p:blipFill>
+        <p:spPr>
+          <a:xfrm>
+            <a:off x="4647976" y="2298966"/>
+            <a:ext cx="2880360" cy="2261081"/>
+          </a:xfrm>
+          <a:prstGeom prst="rect">
+            <a:avLst/>
+          </a:prstGeom>
+        </p:spPr>
+      </p:pic>
+      <p:sp>
+        <p:nvSpPr>
+          <p:cNvPr id="43" name="Rectangle 42">
+            <a:extLst>
+              <a:ext uri="{FF2B5EF4-FFF2-40B4-BE49-F238E27FC236}">
+                <a16:creationId xmlns:a16="http://schemas.microsoft.com/office/drawing/2014/main" id="{BCB5D417-2A71-445D-B4C7-9E814D633D33}"/>
+              </a:ext>
+              <a:ext uri="{C183D7F6-B498-43B3-948B-1728B52AA6E4}">
+                <adec:decorative xmlns:adec="http://schemas.microsoft.com/office/drawing/2017/decorative" val="1"/>
+              </a:ext>
+            </a:extLst>
+          </p:cNvPr>
+          <p:cNvSpPr>
+            <a:spLocks noGrp="1" noRot="1" noChangeAspect="1" noMove="1" noResize="1" noEditPoints="1" noAdjustHandles="1" noChangeArrowheads="1" noChangeShapeType="1" noTextEdit="1"/>
+          </p:cNvSpPr>
+          <p:nvPr>
+            <p:extLst>
+              <p:ext uri="{386F3935-93C4-4BCD-93E2-E3B085C9AB24}">
+                <p16:designElem xmlns:p16="http://schemas.microsoft.com/office/powerpoint/2015/main" val="1"/>
+              </p:ext>
+            </p:extLst>
+          </p:nvPr>
+        </p:nvSpPr>
+        <p:spPr>
+          <a:xfrm>
+            <a:off x="8022847" y="643466"/>
+            <a:ext cx="3522548" cy="5571067"/>
+          </a:xfrm>
+          <a:prstGeom prst="rect">
+            <a:avLst/>
+          </a:prstGeom>
+          <a:solidFill>
+            <a:srgbClr val="FFFFFF"/>
+          </a:solidFill>
+          <a:ln w="9525">
+            <a:noFill/>
+          </a:ln>
+          <a:effectLst>
+            <a:outerShdw blurRad="63500" dist="17780" dir="5400000" algn="t" rotWithShape="0">
+              <a:prstClr val="black">
+                <a:alpha val="43000"/>
+              </a:prstClr>
+            </a:outerShdw>
+          </a:effectLst>
+        </p:spPr>
+        <p:style>
+          <a:lnRef idx="2">
+            <a:schemeClr val="accent1">
+              <a:shade val="50000"/>
+            </a:schemeClr>
+          </a:lnRef>
+          <a:fillRef idx="1">
+            <a:schemeClr val="accent1"/>
+          </a:fillRef>
+          <a:effectRef idx="0">
+            <a:schemeClr val="accent1"/>
+          </a:effectRef>
+          <a:fontRef idx="minor">
+            <a:schemeClr val="lt1"/>
+          </a:fontRef>
+        </p:style>
+        <p:txBody>
+          <a:bodyPr rtlCol="0" anchor="ctr"/>
+          <a:lstStyle/>
+          <a:p>
+            <a:pPr algn="ctr"/>
+            <a:endParaRPr lang="en-US"/>
+          </a:p>
+        </p:txBody>
+      </p:sp>
+      <p:pic>
+        <p:nvPicPr>
+          <p:cNvPr id="8" name="Picture 7">
+            <a:extLst>
+              <a:ext uri="{FF2B5EF4-FFF2-40B4-BE49-F238E27FC236}">
+                <a16:creationId xmlns:a16="http://schemas.microsoft.com/office/drawing/2014/main" id="{06B7F516-1EEE-9143-86EF-666C15096938}"/>
+              </a:ext>
+            </a:extLst>
+          </p:cNvPr>
+          <p:cNvPicPr>
+            <a:picLocks noChangeAspect="1"/>
+          </p:cNvPicPr>
+          <p:nvPr/>
+        </p:nvPicPr>
+        <p:blipFill>
+          <a:blip r:embed="rId4"/>
+          <a:stretch>
+            <a:fillRect/>
+          </a:stretch>
+        </p:blipFill>
+        <p:spPr>
+          <a:xfrm>
+            <a:off x="8343941" y="2892532"/>
+            <a:ext cx="2880360" cy="1072934"/>
+          </a:xfrm>
+          <a:prstGeom prst="rect">
+            <a:avLst/>
+          </a:prstGeom>
+        </p:spPr>
+      </p:pic>
     </p:spTree>
     <p:extLst>
       <p:ext uri="{BB962C8B-B14F-4D97-AF65-F5344CB8AC3E}">
@@ -6757,6 +7110,1541 @@
 </file>
 
 <file path=ppt/slides/slide11.xml><?xml version="1.0" encoding="utf-8"?>
+<p:sld xmlns:a="http://schemas.openxmlformats.org/drawingml/2006/main" xmlns:r="http://schemas.openxmlformats.org/officeDocument/2006/relationships" xmlns:p="http://schemas.openxmlformats.org/presentationml/2006/main">
+  <p:cSld>
+    <p:bg>
+      <p:bgPr>
+        <a:blipFill rotWithShape="1">
+          <a:blip r:embed="rId2">
+            <a:duotone>
+              <a:schemeClr val="bg2">
+                <a:shade val="69000"/>
+                <a:hueMod val="108000"/>
+                <a:satMod val="164000"/>
+                <a:lumMod val="74000"/>
+              </a:schemeClr>
+              <a:schemeClr val="bg2">
+                <a:tint val="96000"/>
+                <a:hueMod val="88000"/>
+                <a:satMod val="140000"/>
+                <a:lumMod val="132000"/>
+              </a:schemeClr>
+            </a:duotone>
+            <a:extLst/>
+          </a:blip>
+          <a:stretch/>
+        </a:blipFill>
+        <a:effectLst/>
+      </p:bgPr>
+    </p:bg>
+    <p:spTree>
+      <p:nvGrpSpPr>
+        <p:cNvPr id="1" name=""/>
+        <p:cNvGrpSpPr/>
+        <p:nvPr/>
+      </p:nvGrpSpPr>
+      <p:grpSpPr>
+        <a:xfrm>
+          <a:off x="0" y="0"/>
+          <a:ext cx="0" cy="0"/>
+          <a:chOff x="0" y="0"/>
+          <a:chExt cx="0" cy="0"/>
+        </a:xfrm>
+      </p:grpSpPr>
+      <p:sp>
+        <p:nvSpPr>
+          <p:cNvPr id="10" name="Rectangle 9">
+            <a:extLst>
+              <a:ext uri="{FF2B5EF4-FFF2-40B4-BE49-F238E27FC236}">
+                <a16:creationId xmlns:a16="http://schemas.microsoft.com/office/drawing/2014/main" id="{B77F70CF-51B7-4A07-A16B-70DFA49427F9}"/>
+              </a:ext>
+              <a:ext uri="{C183D7F6-B498-43B3-948B-1728B52AA6E4}">
+                <adec:decorative xmlns:adec="http://schemas.microsoft.com/office/drawing/2017/decorative" val="1"/>
+              </a:ext>
+            </a:extLst>
+          </p:cNvPr>
+          <p:cNvSpPr>
+            <a:spLocks noGrp="1" noRot="1" noChangeAspect="1" noMove="1" noResize="1" noEditPoints="1" noAdjustHandles="1" noChangeArrowheads="1" noChangeShapeType="1" noTextEdit="1"/>
+          </p:cNvSpPr>
+          <p:nvPr>
+            <p:extLst>
+              <p:ext uri="{386F3935-93C4-4BCD-93E2-E3B085C9AB24}">
+                <p16:designElem xmlns:p16="http://schemas.microsoft.com/office/powerpoint/2015/main" val="1"/>
+              </p:ext>
+            </p:extLst>
+          </p:nvPr>
+        </p:nvSpPr>
+        <p:spPr>
+          <a:xfrm>
+            <a:off x="0" y="0"/>
+            <a:ext cx="12192000" cy="6858000"/>
+          </a:xfrm>
+          <a:prstGeom prst="rect">
+            <a:avLst/>
+          </a:prstGeom>
+          <a:solidFill>
+            <a:schemeClr val="bg2"/>
+          </a:solidFill>
+          <a:ln>
+            <a:noFill/>
+          </a:ln>
+        </p:spPr>
+        <p:style>
+          <a:lnRef idx="2">
+            <a:schemeClr val="accent1">
+              <a:shade val="50000"/>
+            </a:schemeClr>
+          </a:lnRef>
+          <a:fillRef idx="1">
+            <a:schemeClr val="accent1"/>
+          </a:fillRef>
+          <a:effectRef idx="0">
+            <a:schemeClr val="accent1"/>
+          </a:effectRef>
+          <a:fontRef idx="minor">
+            <a:schemeClr val="lt1"/>
+          </a:fontRef>
+        </p:style>
+        <p:txBody>
+          <a:bodyPr rtlCol="0" anchor="ctr"/>
+          <a:lstStyle/>
+          <a:p>
+            <a:pPr algn="ctr"/>
+            <a:endParaRPr lang="en-US" dirty="0"/>
+          </a:p>
+        </p:txBody>
+      </p:sp>
+      <p:sp>
+        <p:nvSpPr>
+          <p:cNvPr id="12" name="Rectangle 11">
+            <a:extLst>
+              <a:ext uri="{FF2B5EF4-FFF2-40B4-BE49-F238E27FC236}">
+                <a16:creationId xmlns:a16="http://schemas.microsoft.com/office/drawing/2014/main" id="{C98594B0-DC7B-4BAF-B0F2-8557CBDE6BE6}"/>
+              </a:ext>
+              <a:ext uri="{C183D7F6-B498-43B3-948B-1728B52AA6E4}">
+                <adec:decorative xmlns:adec="http://schemas.microsoft.com/office/drawing/2017/decorative" val="1"/>
+              </a:ext>
+            </a:extLst>
+          </p:cNvPr>
+          <p:cNvSpPr>
+            <a:spLocks noGrp="1" noRot="1" noChangeAspect="1" noMove="1" noResize="1" noEditPoints="1" noAdjustHandles="1" noChangeArrowheads="1" noChangeShapeType="1" noTextEdit="1"/>
+          </p:cNvSpPr>
+          <p:nvPr>
+            <p:extLst>
+              <p:ext uri="{386F3935-93C4-4BCD-93E2-E3B085C9AB24}">
+                <p16:designElem xmlns:p16="http://schemas.microsoft.com/office/powerpoint/2015/main" val="1"/>
+              </p:ext>
+            </p:extLst>
+          </p:nvPr>
+        </p:nvSpPr>
+        <p:spPr>
+          <a:xfrm>
+            <a:off x="477012" y="480060"/>
+            <a:ext cx="4661461" cy="5897880"/>
+          </a:xfrm>
+          <a:prstGeom prst="rect">
+            <a:avLst/>
+          </a:prstGeom>
+          <a:solidFill>
+            <a:srgbClr val="FFFFFF"/>
+          </a:solidFill>
+          <a:ln w="22225">
+            <a:solidFill>
+              <a:schemeClr val="tx1">
+                <a:lumMod val="50000"/>
+                <a:lumOff val="50000"/>
+              </a:schemeClr>
+            </a:solidFill>
+          </a:ln>
+        </p:spPr>
+        <p:style>
+          <a:lnRef idx="2">
+            <a:schemeClr val="accent1">
+              <a:shade val="50000"/>
+            </a:schemeClr>
+          </a:lnRef>
+          <a:fillRef idx="1">
+            <a:schemeClr val="accent1"/>
+          </a:fillRef>
+          <a:effectRef idx="0">
+            <a:schemeClr val="accent1"/>
+          </a:effectRef>
+          <a:fontRef idx="minor">
+            <a:schemeClr val="lt1"/>
+          </a:fontRef>
+        </p:style>
+        <p:txBody>
+          <a:bodyPr rtlCol="0" anchor="ctr"/>
+          <a:lstStyle/>
+          <a:p>
+            <a:pPr algn="ctr"/>
+            <a:endParaRPr lang="en-US"/>
+          </a:p>
+        </p:txBody>
+      </p:sp>
+      <p:pic>
+        <p:nvPicPr>
+          <p:cNvPr id="5" name="Picture 4">
+            <a:extLst>
+              <a:ext uri="{FF2B5EF4-FFF2-40B4-BE49-F238E27FC236}">
+                <a16:creationId xmlns:a16="http://schemas.microsoft.com/office/drawing/2014/main" id="{26A7B165-AE8B-C648-A761-18AAEE1CECAC}"/>
+              </a:ext>
+            </a:extLst>
+          </p:cNvPr>
+          <p:cNvPicPr>
+            <a:picLocks noChangeAspect="1"/>
+          </p:cNvPicPr>
+          <p:nvPr/>
+        </p:nvPicPr>
+        <p:blipFill>
+          <a:blip r:embed="rId3"/>
+          <a:stretch>
+            <a:fillRect/>
+          </a:stretch>
+        </p:blipFill>
+        <p:spPr>
+          <a:xfrm>
+            <a:off x="643466" y="1383320"/>
+            <a:ext cx="4329482" cy="4091359"/>
+          </a:xfrm>
+          <a:prstGeom prst="rect">
+            <a:avLst/>
+          </a:prstGeom>
+        </p:spPr>
+      </p:pic>
+      <p:sp>
+        <p:nvSpPr>
+          <p:cNvPr id="14" name="Rectangle 13">
+            <a:extLst>
+              <a:ext uri="{FF2B5EF4-FFF2-40B4-BE49-F238E27FC236}">
+                <a16:creationId xmlns:a16="http://schemas.microsoft.com/office/drawing/2014/main" id="{27A76E6C-02DD-4FDA-9F96-21BD3F4E45B7}"/>
+              </a:ext>
+              <a:ext uri="{C183D7F6-B498-43B3-948B-1728B52AA6E4}">
+                <adec:decorative xmlns:adec="http://schemas.microsoft.com/office/drawing/2017/decorative" val="1"/>
+              </a:ext>
+            </a:extLst>
+          </p:cNvPr>
+          <p:cNvSpPr>
+            <a:spLocks noGrp="1" noRot="1" noChangeAspect="1" noMove="1" noResize="1" noEditPoints="1" noAdjustHandles="1" noChangeArrowheads="1" noChangeShapeType="1" noTextEdit="1"/>
+          </p:cNvSpPr>
+          <p:nvPr>
+            <p:extLst>
+              <p:ext uri="{386F3935-93C4-4BCD-93E2-E3B085C9AB24}">
+                <p16:designElem xmlns:p16="http://schemas.microsoft.com/office/powerpoint/2015/main" val="1"/>
+              </p:ext>
+            </p:extLst>
+          </p:nvPr>
+        </p:nvSpPr>
+        <p:spPr>
+          <a:xfrm>
+            <a:off x="5299341" y="480060"/>
+            <a:ext cx="4661460" cy="5897880"/>
+          </a:xfrm>
+          <a:prstGeom prst="rect">
+            <a:avLst/>
+          </a:prstGeom>
+          <a:solidFill>
+            <a:srgbClr val="FFFFFF"/>
+          </a:solidFill>
+          <a:ln w="22225">
+            <a:solidFill>
+              <a:schemeClr val="tx1">
+                <a:lumMod val="50000"/>
+                <a:lumOff val="50000"/>
+              </a:schemeClr>
+            </a:solidFill>
+          </a:ln>
+        </p:spPr>
+        <p:style>
+          <a:lnRef idx="2">
+            <a:schemeClr val="accent1">
+              <a:shade val="50000"/>
+            </a:schemeClr>
+          </a:lnRef>
+          <a:fillRef idx="1">
+            <a:schemeClr val="accent1"/>
+          </a:fillRef>
+          <a:effectRef idx="0">
+            <a:schemeClr val="accent1"/>
+          </a:effectRef>
+          <a:fontRef idx="minor">
+            <a:schemeClr val="lt1"/>
+          </a:fontRef>
+        </p:style>
+        <p:txBody>
+          <a:bodyPr rtlCol="0" anchor="ctr"/>
+          <a:lstStyle/>
+          <a:p>
+            <a:pPr algn="ctr"/>
+            <a:endParaRPr lang="en-US"/>
+          </a:p>
+        </p:txBody>
+      </p:sp>
+      <p:sp>
+        <p:nvSpPr>
+          <p:cNvPr id="16" name="Rectangle 15">
+            <a:extLst>
+              <a:ext uri="{FF2B5EF4-FFF2-40B4-BE49-F238E27FC236}">
+                <a16:creationId xmlns:a16="http://schemas.microsoft.com/office/drawing/2014/main" id="{D4D9AAD4-B929-4AE3-A27C-651AF2069ED0}"/>
+              </a:ext>
+              <a:ext uri="{C183D7F6-B498-43B3-948B-1728B52AA6E4}">
+                <adec:decorative xmlns:adec="http://schemas.microsoft.com/office/drawing/2017/decorative" val="1"/>
+              </a:ext>
+            </a:extLst>
+          </p:cNvPr>
+          <p:cNvSpPr>
+            <a:spLocks noGrp="1" noRot="1" noChangeAspect="1" noMove="1" noResize="1" noEditPoints="1" noAdjustHandles="1" noChangeArrowheads="1" noChangeShapeType="1" noTextEdit="1"/>
+          </p:cNvSpPr>
+          <p:nvPr>
+            <p:extLst>
+              <p:ext uri="{386F3935-93C4-4BCD-93E2-E3B085C9AB24}">
+                <p16:designElem xmlns:p16="http://schemas.microsoft.com/office/powerpoint/2015/main" val="1"/>
+              </p:ext>
+            </p:extLst>
+          </p:nvPr>
+        </p:nvSpPr>
+        <p:spPr>
+          <a:xfrm>
+            <a:off x="10437812" y="0"/>
+            <a:ext cx="685800" cy="1143000"/>
+          </a:xfrm>
+          <a:prstGeom prst="rect">
+            <a:avLst/>
+          </a:prstGeom>
+          <a:solidFill>
+            <a:schemeClr val="accent1"/>
+          </a:solidFill>
+          <a:ln>
+            <a:noFill/>
+          </a:ln>
+        </p:spPr>
+        <p:style>
+          <a:lnRef idx="1">
+            <a:schemeClr val="accent1"/>
+          </a:lnRef>
+          <a:fillRef idx="3">
+            <a:schemeClr val="accent1"/>
+          </a:fillRef>
+          <a:effectRef idx="2">
+            <a:schemeClr val="accent1"/>
+          </a:effectRef>
+          <a:fontRef idx="minor">
+            <a:schemeClr val="lt1"/>
+          </a:fontRef>
+        </p:style>
+      </p:sp>
+      <p:pic>
+        <p:nvPicPr>
+          <p:cNvPr id="7" name="Picture 6">
+            <a:extLst>
+              <a:ext uri="{FF2B5EF4-FFF2-40B4-BE49-F238E27FC236}">
+                <a16:creationId xmlns:a16="http://schemas.microsoft.com/office/drawing/2014/main" id="{BCABF4E1-EDCB-5740-877E-1D284C0792FB}"/>
+              </a:ext>
+            </a:extLst>
+          </p:cNvPr>
+          <p:cNvPicPr>
+            <a:picLocks noChangeAspect="1"/>
+          </p:cNvPicPr>
+          <p:nvPr/>
+        </p:nvPicPr>
+        <p:blipFill>
+          <a:blip r:embed="rId4"/>
+          <a:stretch>
+            <a:fillRect/>
+          </a:stretch>
+        </p:blipFill>
+        <p:spPr>
+          <a:xfrm>
+            <a:off x="5636171" y="2546349"/>
+            <a:ext cx="3987800" cy="1765300"/>
+          </a:xfrm>
+          <a:prstGeom prst="rect">
+            <a:avLst/>
+          </a:prstGeom>
+        </p:spPr>
+      </p:pic>
+    </p:spTree>
+    <p:extLst>
+      <p:ext uri="{BB962C8B-B14F-4D97-AF65-F5344CB8AC3E}">
+        <p14:creationId xmlns:p14="http://schemas.microsoft.com/office/powerpoint/2010/main" val="3356885585"/>
+      </p:ext>
+    </p:extLst>
+  </p:cSld>
+  <p:clrMapOvr>
+    <a:masterClrMapping/>
+  </p:clrMapOvr>
+</p:sld>
+</file>
+
+<file path=ppt/slides/slide12.xml><?xml version="1.0" encoding="utf-8"?>
+<p:sld xmlns:a="http://schemas.openxmlformats.org/drawingml/2006/main" xmlns:r="http://schemas.openxmlformats.org/officeDocument/2006/relationships" xmlns:p="http://schemas.openxmlformats.org/presentationml/2006/main">
+  <p:cSld>
+    <p:bg>
+      <p:bgPr>
+        <a:solidFill>
+          <a:schemeClr val="bg1"/>
+        </a:solidFill>
+        <a:effectLst/>
+      </p:bgPr>
+    </p:bg>
+    <p:spTree>
+      <p:nvGrpSpPr>
+        <p:cNvPr id="1" name=""/>
+        <p:cNvGrpSpPr/>
+        <p:nvPr/>
+      </p:nvGrpSpPr>
+      <p:grpSpPr>
+        <a:xfrm>
+          <a:off x="0" y="0"/>
+          <a:ext cx="0" cy="0"/>
+          <a:chOff x="0" y="0"/>
+          <a:chExt cx="0" cy="0"/>
+        </a:xfrm>
+      </p:grpSpPr>
+      <p:sp>
+        <p:nvSpPr>
+          <p:cNvPr id="12" name="Rectangle 11">
+            <a:extLst>
+              <a:ext uri="{FF2B5EF4-FFF2-40B4-BE49-F238E27FC236}">
+                <a16:creationId xmlns:a16="http://schemas.microsoft.com/office/drawing/2014/main" id="{56827C3C-D52F-46CE-A441-3CD6A1A6A0A2}"/>
+              </a:ext>
+              <a:ext uri="{C183D7F6-B498-43B3-948B-1728B52AA6E4}">
+                <adec:decorative xmlns:adec="http://schemas.microsoft.com/office/drawing/2017/decorative" val="1"/>
+              </a:ext>
+            </a:extLst>
+          </p:cNvPr>
+          <p:cNvSpPr>
+            <a:spLocks noGrp="1" noRot="1" noChangeAspect="1" noMove="1" noResize="1" noEditPoints="1" noAdjustHandles="1" noChangeArrowheads="1" noChangeShapeType="1" noTextEdit="1"/>
+          </p:cNvSpPr>
+          <p:nvPr>
+            <p:extLst>
+              <p:ext uri="{386F3935-93C4-4BCD-93E2-E3B085C9AB24}">
+                <p16:designElem xmlns:p16="http://schemas.microsoft.com/office/powerpoint/2015/main" val="1"/>
+              </p:ext>
+            </p:extLst>
+          </p:nvPr>
+        </p:nvSpPr>
+        <p:spPr>
+          <a:xfrm>
+            <a:off x="3137" y="0"/>
+            <a:ext cx="12192000" cy="6858000"/>
+          </a:xfrm>
+          <a:prstGeom prst="rect">
+            <a:avLst/>
+          </a:prstGeom>
+          <a:solidFill>
+            <a:schemeClr val="bg1">
+              <a:lumMod val="85000"/>
+              <a:alpha val="90000"/>
+            </a:schemeClr>
+          </a:solidFill>
+          <a:ln>
+            <a:noFill/>
+          </a:ln>
+        </p:spPr>
+        <p:style>
+          <a:lnRef idx="2">
+            <a:schemeClr val="accent1">
+              <a:shade val="50000"/>
+            </a:schemeClr>
+          </a:lnRef>
+          <a:fillRef idx="1">
+            <a:schemeClr val="accent1"/>
+          </a:fillRef>
+          <a:effectRef idx="0">
+            <a:schemeClr val="accent1"/>
+          </a:effectRef>
+          <a:fontRef idx="minor">
+            <a:schemeClr val="lt1"/>
+          </a:fontRef>
+        </p:style>
+        <p:txBody>
+          <a:bodyPr rtlCol="0" anchor="ctr"/>
+          <a:lstStyle/>
+          <a:p>
+            <a:pPr algn="ctr"/>
+            <a:endParaRPr lang="en-US"/>
+          </a:p>
+        </p:txBody>
+      </p:sp>
+      <p:sp>
+        <p:nvSpPr>
+          <p:cNvPr id="14" name="Rectangle 13">
+            <a:extLst>
+              <a:ext uri="{FF2B5EF4-FFF2-40B4-BE49-F238E27FC236}">
+                <a16:creationId xmlns:a16="http://schemas.microsoft.com/office/drawing/2014/main" id="{F52A8B51-0A89-497B-B882-6658E029A3F9}"/>
+              </a:ext>
+              <a:ext uri="{C183D7F6-B498-43B3-948B-1728B52AA6E4}">
+                <adec:decorative xmlns:adec="http://schemas.microsoft.com/office/drawing/2017/decorative" val="1"/>
+              </a:ext>
+            </a:extLst>
+          </p:cNvPr>
+          <p:cNvSpPr>
+            <a:spLocks noGrp="1" noRot="1" noChangeAspect="1" noMove="1" noResize="1" noEditPoints="1" noAdjustHandles="1" noChangeArrowheads="1" noChangeShapeType="1" noTextEdit="1"/>
+          </p:cNvSpPr>
+          <p:nvPr>
+            <p:extLst>
+              <p:ext uri="{386F3935-93C4-4BCD-93E2-E3B085C9AB24}">
+                <p16:designElem xmlns:p16="http://schemas.microsoft.com/office/powerpoint/2015/main" val="1"/>
+              </p:ext>
+            </p:extLst>
+          </p:nvPr>
+        </p:nvSpPr>
+        <p:spPr>
+          <a:xfrm>
+            <a:off x="643467" y="643466"/>
+            <a:ext cx="3522548" cy="5571067"/>
+          </a:xfrm>
+          <a:prstGeom prst="rect">
+            <a:avLst/>
+          </a:prstGeom>
+          <a:solidFill>
+            <a:srgbClr val="FFFFFF"/>
+          </a:solidFill>
+          <a:ln w="9525">
+            <a:noFill/>
+          </a:ln>
+          <a:effectLst>
+            <a:outerShdw blurRad="63500" dist="17780" dir="5400000" algn="t" rotWithShape="0">
+              <a:prstClr val="black">
+                <a:alpha val="43000"/>
+              </a:prstClr>
+            </a:outerShdw>
+          </a:effectLst>
+        </p:spPr>
+        <p:style>
+          <a:lnRef idx="2">
+            <a:schemeClr val="accent1">
+              <a:shade val="50000"/>
+            </a:schemeClr>
+          </a:lnRef>
+          <a:fillRef idx="1">
+            <a:schemeClr val="accent1"/>
+          </a:fillRef>
+          <a:effectRef idx="0">
+            <a:schemeClr val="accent1"/>
+          </a:effectRef>
+          <a:fontRef idx="minor">
+            <a:schemeClr val="lt1"/>
+          </a:fontRef>
+        </p:style>
+        <p:txBody>
+          <a:bodyPr rtlCol="0" anchor="ctr"/>
+          <a:lstStyle/>
+          <a:p>
+            <a:pPr algn="ctr"/>
+            <a:endParaRPr lang="en-US"/>
+          </a:p>
+        </p:txBody>
+      </p:sp>
+      <p:pic>
+        <p:nvPicPr>
+          <p:cNvPr id="5" name="Picture 4">
+            <a:extLst>
+              <a:ext uri="{FF2B5EF4-FFF2-40B4-BE49-F238E27FC236}">
+                <a16:creationId xmlns:a16="http://schemas.microsoft.com/office/drawing/2014/main" id="{977F0328-E5EB-1347-B79A-77F3D8807D8B}"/>
+              </a:ext>
+            </a:extLst>
+          </p:cNvPr>
+          <p:cNvPicPr>
+            <a:picLocks noChangeAspect="1"/>
+          </p:cNvPicPr>
+          <p:nvPr/>
+        </p:nvPicPr>
+        <p:blipFill>
+          <a:blip r:embed="rId2"/>
+          <a:stretch>
+            <a:fillRect/>
+          </a:stretch>
+        </p:blipFill>
+        <p:spPr>
+          <a:xfrm>
+            <a:off x="965200" y="1490223"/>
+            <a:ext cx="2879083" cy="3877553"/>
+          </a:xfrm>
+          <a:prstGeom prst="rect">
+            <a:avLst/>
+          </a:prstGeom>
+        </p:spPr>
+      </p:pic>
+      <p:sp>
+        <p:nvSpPr>
+          <p:cNvPr id="19" name="Rectangle 15">
+            <a:extLst>
+              <a:ext uri="{FF2B5EF4-FFF2-40B4-BE49-F238E27FC236}">
+                <a16:creationId xmlns:a16="http://schemas.microsoft.com/office/drawing/2014/main" id="{EB1CEFBF-6F09-4052-862B-E219DA15757E}"/>
+              </a:ext>
+              <a:ext uri="{C183D7F6-B498-43B3-948B-1728B52AA6E4}">
+                <adec:decorative xmlns:adec="http://schemas.microsoft.com/office/drawing/2017/decorative" val="1"/>
+              </a:ext>
+            </a:extLst>
+          </p:cNvPr>
+          <p:cNvSpPr>
+            <a:spLocks noGrp="1" noRot="1" noChangeAspect="1" noMove="1" noResize="1" noEditPoints="1" noAdjustHandles="1" noChangeArrowheads="1" noChangeShapeType="1" noTextEdit="1"/>
+          </p:cNvSpPr>
+          <p:nvPr>
+            <p:extLst>
+              <p:ext uri="{386F3935-93C4-4BCD-93E2-E3B085C9AB24}">
+                <p16:designElem xmlns:p16="http://schemas.microsoft.com/office/powerpoint/2015/main" val="1"/>
+              </p:ext>
+            </p:extLst>
+          </p:nvPr>
+        </p:nvSpPr>
+        <p:spPr>
+          <a:xfrm>
+            <a:off x="4326882" y="643466"/>
+            <a:ext cx="3522548" cy="5571067"/>
+          </a:xfrm>
+          <a:prstGeom prst="rect">
+            <a:avLst/>
+          </a:prstGeom>
+          <a:solidFill>
+            <a:srgbClr val="FFFFFF"/>
+          </a:solidFill>
+          <a:ln w="9525">
+            <a:noFill/>
+          </a:ln>
+          <a:effectLst>
+            <a:outerShdw blurRad="63500" dist="17780" dir="5400000" algn="t" rotWithShape="0">
+              <a:prstClr val="black">
+                <a:alpha val="43000"/>
+              </a:prstClr>
+            </a:outerShdw>
+          </a:effectLst>
+        </p:spPr>
+        <p:style>
+          <a:lnRef idx="2">
+            <a:schemeClr val="accent1">
+              <a:shade val="50000"/>
+            </a:schemeClr>
+          </a:lnRef>
+          <a:fillRef idx="1">
+            <a:schemeClr val="accent1"/>
+          </a:fillRef>
+          <a:effectRef idx="0">
+            <a:schemeClr val="accent1"/>
+          </a:effectRef>
+          <a:fontRef idx="minor">
+            <a:schemeClr val="lt1"/>
+          </a:fontRef>
+        </p:style>
+        <p:txBody>
+          <a:bodyPr rtlCol="0" anchor="ctr"/>
+          <a:lstStyle/>
+          <a:p>
+            <a:pPr algn="ctr"/>
+            <a:endParaRPr lang="en-US"/>
+          </a:p>
+        </p:txBody>
+      </p:sp>
+      <p:pic>
+        <p:nvPicPr>
+          <p:cNvPr id="7" name="Picture 6">
+            <a:extLst>
+              <a:ext uri="{FF2B5EF4-FFF2-40B4-BE49-F238E27FC236}">
+                <a16:creationId xmlns:a16="http://schemas.microsoft.com/office/drawing/2014/main" id="{4C58CFCD-2911-A04A-8088-822167566963}"/>
+              </a:ext>
+            </a:extLst>
+          </p:cNvPr>
+          <p:cNvPicPr>
+            <a:picLocks noChangeAspect="1"/>
+          </p:cNvPicPr>
+          <p:nvPr/>
+        </p:nvPicPr>
+        <p:blipFill>
+          <a:blip r:embed="rId3"/>
+          <a:stretch>
+            <a:fillRect/>
+          </a:stretch>
+        </p:blipFill>
+        <p:spPr>
+          <a:xfrm>
+            <a:off x="4647976" y="1929319"/>
+            <a:ext cx="2880360" cy="3000375"/>
+          </a:xfrm>
+          <a:prstGeom prst="rect">
+            <a:avLst/>
+          </a:prstGeom>
+        </p:spPr>
+      </p:pic>
+      <p:sp>
+        <p:nvSpPr>
+          <p:cNvPr id="18" name="Rectangle 17">
+            <a:extLst>
+              <a:ext uri="{FF2B5EF4-FFF2-40B4-BE49-F238E27FC236}">
+                <a16:creationId xmlns:a16="http://schemas.microsoft.com/office/drawing/2014/main" id="{BCB5D417-2A71-445D-B4C7-9E814D633D33}"/>
+              </a:ext>
+              <a:ext uri="{C183D7F6-B498-43B3-948B-1728B52AA6E4}">
+                <adec:decorative xmlns:adec="http://schemas.microsoft.com/office/drawing/2017/decorative" val="1"/>
+              </a:ext>
+            </a:extLst>
+          </p:cNvPr>
+          <p:cNvSpPr>
+            <a:spLocks noGrp="1" noRot="1" noChangeAspect="1" noMove="1" noResize="1" noEditPoints="1" noAdjustHandles="1" noChangeArrowheads="1" noChangeShapeType="1" noTextEdit="1"/>
+          </p:cNvSpPr>
+          <p:nvPr>
+            <p:extLst>
+              <p:ext uri="{386F3935-93C4-4BCD-93E2-E3B085C9AB24}">
+                <p16:designElem xmlns:p16="http://schemas.microsoft.com/office/powerpoint/2015/main" val="1"/>
+              </p:ext>
+            </p:extLst>
+          </p:nvPr>
+        </p:nvSpPr>
+        <p:spPr>
+          <a:xfrm>
+            <a:off x="8022847" y="643466"/>
+            <a:ext cx="3522548" cy="5571067"/>
+          </a:xfrm>
+          <a:prstGeom prst="rect">
+            <a:avLst/>
+          </a:prstGeom>
+          <a:solidFill>
+            <a:srgbClr val="FFFFFF"/>
+          </a:solidFill>
+          <a:ln w="9525">
+            <a:noFill/>
+          </a:ln>
+          <a:effectLst>
+            <a:outerShdw blurRad="63500" dist="17780" dir="5400000" algn="t" rotWithShape="0">
+              <a:prstClr val="black">
+                <a:alpha val="43000"/>
+              </a:prstClr>
+            </a:outerShdw>
+          </a:effectLst>
+        </p:spPr>
+        <p:style>
+          <a:lnRef idx="2">
+            <a:schemeClr val="accent1">
+              <a:shade val="50000"/>
+            </a:schemeClr>
+          </a:lnRef>
+          <a:fillRef idx="1">
+            <a:schemeClr val="accent1"/>
+          </a:fillRef>
+          <a:effectRef idx="0">
+            <a:schemeClr val="accent1"/>
+          </a:effectRef>
+          <a:fontRef idx="minor">
+            <a:schemeClr val="lt1"/>
+          </a:fontRef>
+        </p:style>
+        <p:txBody>
+          <a:bodyPr rtlCol="0" anchor="ctr"/>
+          <a:lstStyle/>
+          <a:p>
+            <a:pPr algn="ctr"/>
+            <a:endParaRPr lang="en-US"/>
+          </a:p>
+        </p:txBody>
+      </p:sp>
+      <p:pic>
+        <p:nvPicPr>
+          <p:cNvPr id="3" name="Picture 2">
+            <a:extLst>
+              <a:ext uri="{FF2B5EF4-FFF2-40B4-BE49-F238E27FC236}">
+                <a16:creationId xmlns:a16="http://schemas.microsoft.com/office/drawing/2014/main" id="{459528B3-736C-F940-B655-28A33429B942}"/>
+              </a:ext>
+            </a:extLst>
+          </p:cNvPr>
+          <p:cNvPicPr>
+            <a:picLocks noChangeAspect="1"/>
+          </p:cNvPicPr>
+          <p:nvPr/>
+        </p:nvPicPr>
+        <p:blipFill>
+          <a:blip r:embed="rId4"/>
+          <a:stretch>
+            <a:fillRect/>
+          </a:stretch>
+        </p:blipFill>
+        <p:spPr>
+          <a:xfrm>
+            <a:off x="8343941" y="2280456"/>
+            <a:ext cx="2880360" cy="2297086"/>
+          </a:xfrm>
+          <a:prstGeom prst="rect">
+            <a:avLst/>
+          </a:prstGeom>
+        </p:spPr>
+      </p:pic>
+    </p:spTree>
+    <p:extLst>
+      <p:ext uri="{BB962C8B-B14F-4D97-AF65-F5344CB8AC3E}">
+        <p14:creationId xmlns:p14="http://schemas.microsoft.com/office/powerpoint/2010/main" val="3701080197"/>
+      </p:ext>
+    </p:extLst>
+  </p:cSld>
+  <p:clrMapOvr>
+    <a:masterClrMapping/>
+  </p:clrMapOvr>
+</p:sld>
+</file>
+
+<file path=ppt/slides/slide13.xml><?xml version="1.0" encoding="utf-8"?>
+<p:sld xmlns:a="http://schemas.openxmlformats.org/drawingml/2006/main" xmlns:r="http://schemas.openxmlformats.org/officeDocument/2006/relationships" xmlns:p="http://schemas.openxmlformats.org/presentationml/2006/main">
+  <p:cSld>
+    <p:bg>
+      <p:bgPr>
+        <a:blipFill rotWithShape="1">
+          <a:blip r:embed="rId2">
+            <a:duotone>
+              <a:schemeClr val="bg2">
+                <a:shade val="69000"/>
+                <a:hueMod val="108000"/>
+                <a:satMod val="164000"/>
+                <a:lumMod val="74000"/>
+              </a:schemeClr>
+              <a:schemeClr val="bg2">
+                <a:tint val="96000"/>
+                <a:hueMod val="88000"/>
+                <a:satMod val="140000"/>
+                <a:lumMod val="132000"/>
+              </a:schemeClr>
+            </a:duotone>
+            <a:extLst/>
+          </a:blip>
+          <a:stretch/>
+        </a:blipFill>
+        <a:effectLst/>
+      </p:bgPr>
+    </p:bg>
+    <p:spTree>
+      <p:nvGrpSpPr>
+        <p:cNvPr id="1" name=""/>
+        <p:cNvGrpSpPr/>
+        <p:nvPr/>
+      </p:nvGrpSpPr>
+      <p:grpSpPr>
+        <a:xfrm>
+          <a:off x="0" y="0"/>
+          <a:ext cx="0" cy="0"/>
+          <a:chOff x="0" y="0"/>
+          <a:chExt cx="0" cy="0"/>
+        </a:xfrm>
+      </p:grpSpPr>
+      <p:sp>
+        <p:nvSpPr>
+          <p:cNvPr id="10" name="Rectangle 9">
+            <a:extLst>
+              <a:ext uri="{FF2B5EF4-FFF2-40B4-BE49-F238E27FC236}">
+                <a16:creationId xmlns:a16="http://schemas.microsoft.com/office/drawing/2014/main" id="{B77F70CF-51B7-4A07-A16B-70DFA49427F9}"/>
+              </a:ext>
+              <a:ext uri="{C183D7F6-B498-43B3-948B-1728B52AA6E4}">
+                <adec:decorative xmlns:adec="http://schemas.microsoft.com/office/drawing/2017/decorative" val="1"/>
+              </a:ext>
+            </a:extLst>
+          </p:cNvPr>
+          <p:cNvSpPr>
+            <a:spLocks noGrp="1" noRot="1" noChangeAspect="1" noMove="1" noResize="1" noEditPoints="1" noAdjustHandles="1" noChangeArrowheads="1" noChangeShapeType="1" noTextEdit="1"/>
+          </p:cNvSpPr>
+          <p:nvPr>
+            <p:extLst>
+              <p:ext uri="{386F3935-93C4-4BCD-93E2-E3B085C9AB24}">
+                <p16:designElem xmlns:p16="http://schemas.microsoft.com/office/powerpoint/2015/main" val="1"/>
+              </p:ext>
+            </p:extLst>
+          </p:nvPr>
+        </p:nvSpPr>
+        <p:spPr>
+          <a:xfrm>
+            <a:off x="0" y="0"/>
+            <a:ext cx="12192000" cy="6858000"/>
+          </a:xfrm>
+          <a:prstGeom prst="rect">
+            <a:avLst/>
+          </a:prstGeom>
+          <a:solidFill>
+            <a:schemeClr val="bg2"/>
+          </a:solidFill>
+          <a:ln>
+            <a:noFill/>
+          </a:ln>
+        </p:spPr>
+        <p:style>
+          <a:lnRef idx="2">
+            <a:schemeClr val="accent1">
+              <a:shade val="50000"/>
+            </a:schemeClr>
+          </a:lnRef>
+          <a:fillRef idx="1">
+            <a:schemeClr val="accent1"/>
+          </a:fillRef>
+          <a:effectRef idx="0">
+            <a:schemeClr val="accent1"/>
+          </a:effectRef>
+          <a:fontRef idx="minor">
+            <a:schemeClr val="lt1"/>
+          </a:fontRef>
+        </p:style>
+        <p:txBody>
+          <a:bodyPr rtlCol="0" anchor="ctr"/>
+          <a:lstStyle/>
+          <a:p>
+            <a:pPr algn="ctr"/>
+            <a:endParaRPr lang="en-US" dirty="0"/>
+          </a:p>
+        </p:txBody>
+      </p:sp>
+      <p:sp>
+        <p:nvSpPr>
+          <p:cNvPr id="12" name="Rectangle 11">
+            <a:extLst>
+              <a:ext uri="{FF2B5EF4-FFF2-40B4-BE49-F238E27FC236}">
+                <a16:creationId xmlns:a16="http://schemas.microsoft.com/office/drawing/2014/main" id="{C98594B0-DC7B-4BAF-B0F2-8557CBDE6BE6}"/>
+              </a:ext>
+              <a:ext uri="{C183D7F6-B498-43B3-948B-1728B52AA6E4}">
+                <adec:decorative xmlns:adec="http://schemas.microsoft.com/office/drawing/2017/decorative" val="1"/>
+              </a:ext>
+            </a:extLst>
+          </p:cNvPr>
+          <p:cNvSpPr>
+            <a:spLocks noGrp="1" noRot="1" noChangeAspect="1" noMove="1" noResize="1" noEditPoints="1" noAdjustHandles="1" noChangeArrowheads="1" noChangeShapeType="1" noTextEdit="1"/>
+          </p:cNvSpPr>
+          <p:nvPr>
+            <p:extLst>
+              <p:ext uri="{386F3935-93C4-4BCD-93E2-E3B085C9AB24}">
+                <p16:designElem xmlns:p16="http://schemas.microsoft.com/office/powerpoint/2015/main" val="1"/>
+              </p:ext>
+            </p:extLst>
+          </p:nvPr>
+        </p:nvSpPr>
+        <p:spPr>
+          <a:xfrm>
+            <a:off x="477012" y="480060"/>
+            <a:ext cx="4661461" cy="5897880"/>
+          </a:xfrm>
+          <a:prstGeom prst="rect">
+            <a:avLst/>
+          </a:prstGeom>
+          <a:solidFill>
+            <a:srgbClr val="FFFFFF"/>
+          </a:solidFill>
+          <a:ln w="22225">
+            <a:solidFill>
+              <a:schemeClr val="tx1">
+                <a:lumMod val="50000"/>
+                <a:lumOff val="50000"/>
+              </a:schemeClr>
+            </a:solidFill>
+          </a:ln>
+        </p:spPr>
+        <p:style>
+          <a:lnRef idx="2">
+            <a:schemeClr val="accent1">
+              <a:shade val="50000"/>
+            </a:schemeClr>
+          </a:lnRef>
+          <a:fillRef idx="1">
+            <a:schemeClr val="accent1"/>
+          </a:fillRef>
+          <a:effectRef idx="0">
+            <a:schemeClr val="accent1"/>
+          </a:effectRef>
+          <a:fontRef idx="minor">
+            <a:schemeClr val="lt1"/>
+          </a:fontRef>
+        </p:style>
+        <p:txBody>
+          <a:bodyPr rtlCol="0" anchor="ctr"/>
+          <a:lstStyle/>
+          <a:p>
+            <a:pPr algn="ctr"/>
+            <a:endParaRPr lang="en-US"/>
+          </a:p>
+        </p:txBody>
+      </p:sp>
+      <p:pic>
+        <p:nvPicPr>
+          <p:cNvPr id="3" name="Picture 2">
+            <a:extLst>
+              <a:ext uri="{FF2B5EF4-FFF2-40B4-BE49-F238E27FC236}">
+                <a16:creationId xmlns:a16="http://schemas.microsoft.com/office/drawing/2014/main" id="{F3F2A0D2-DB07-B94F-AD26-95EF8223F732}"/>
+              </a:ext>
+            </a:extLst>
+          </p:cNvPr>
+          <p:cNvPicPr>
+            <a:picLocks noChangeAspect="1"/>
+          </p:cNvPicPr>
+          <p:nvPr/>
+        </p:nvPicPr>
+        <p:blipFill>
+          <a:blip r:embed="rId3"/>
+          <a:stretch>
+            <a:fillRect/>
+          </a:stretch>
+        </p:blipFill>
+        <p:spPr>
+          <a:xfrm>
+            <a:off x="643466" y="882245"/>
+            <a:ext cx="4329482" cy="5093509"/>
+          </a:xfrm>
+          <a:prstGeom prst="rect">
+            <a:avLst/>
+          </a:prstGeom>
+        </p:spPr>
+      </p:pic>
+      <p:sp>
+        <p:nvSpPr>
+          <p:cNvPr id="14" name="Rectangle 13">
+            <a:extLst>
+              <a:ext uri="{FF2B5EF4-FFF2-40B4-BE49-F238E27FC236}">
+                <a16:creationId xmlns:a16="http://schemas.microsoft.com/office/drawing/2014/main" id="{27A76E6C-02DD-4FDA-9F96-21BD3F4E45B7}"/>
+              </a:ext>
+              <a:ext uri="{C183D7F6-B498-43B3-948B-1728B52AA6E4}">
+                <adec:decorative xmlns:adec="http://schemas.microsoft.com/office/drawing/2017/decorative" val="1"/>
+              </a:ext>
+            </a:extLst>
+          </p:cNvPr>
+          <p:cNvSpPr>
+            <a:spLocks noGrp="1" noRot="1" noChangeAspect="1" noMove="1" noResize="1" noEditPoints="1" noAdjustHandles="1" noChangeArrowheads="1" noChangeShapeType="1" noTextEdit="1"/>
+          </p:cNvSpPr>
+          <p:nvPr>
+            <p:extLst>
+              <p:ext uri="{386F3935-93C4-4BCD-93E2-E3B085C9AB24}">
+                <p16:designElem xmlns:p16="http://schemas.microsoft.com/office/powerpoint/2015/main" val="1"/>
+              </p:ext>
+            </p:extLst>
+          </p:nvPr>
+        </p:nvSpPr>
+        <p:spPr>
+          <a:xfrm>
+            <a:off x="5299341" y="480060"/>
+            <a:ext cx="4661460" cy="5897880"/>
+          </a:xfrm>
+          <a:prstGeom prst="rect">
+            <a:avLst/>
+          </a:prstGeom>
+          <a:solidFill>
+            <a:srgbClr val="FFFFFF"/>
+          </a:solidFill>
+          <a:ln w="22225">
+            <a:solidFill>
+              <a:schemeClr val="tx1">
+                <a:lumMod val="50000"/>
+                <a:lumOff val="50000"/>
+              </a:schemeClr>
+            </a:solidFill>
+          </a:ln>
+        </p:spPr>
+        <p:style>
+          <a:lnRef idx="2">
+            <a:schemeClr val="accent1">
+              <a:shade val="50000"/>
+            </a:schemeClr>
+          </a:lnRef>
+          <a:fillRef idx="1">
+            <a:schemeClr val="accent1"/>
+          </a:fillRef>
+          <a:effectRef idx="0">
+            <a:schemeClr val="accent1"/>
+          </a:effectRef>
+          <a:fontRef idx="minor">
+            <a:schemeClr val="lt1"/>
+          </a:fontRef>
+        </p:style>
+        <p:txBody>
+          <a:bodyPr rtlCol="0" anchor="ctr"/>
+          <a:lstStyle/>
+          <a:p>
+            <a:pPr algn="ctr"/>
+            <a:endParaRPr lang="en-US"/>
+          </a:p>
+        </p:txBody>
+      </p:sp>
+      <p:pic>
+        <p:nvPicPr>
+          <p:cNvPr id="5" name="Picture 4">
+            <a:extLst>
+              <a:ext uri="{FF2B5EF4-FFF2-40B4-BE49-F238E27FC236}">
+                <a16:creationId xmlns:a16="http://schemas.microsoft.com/office/drawing/2014/main" id="{005CC769-809A-B54C-B62C-C29F181A0BF3}"/>
+              </a:ext>
+            </a:extLst>
+          </p:cNvPr>
+          <p:cNvPicPr>
+            <a:picLocks noChangeAspect="1"/>
+          </p:cNvPicPr>
+          <p:nvPr/>
+        </p:nvPicPr>
+        <p:blipFill>
+          <a:blip r:embed="rId4"/>
+          <a:stretch>
+            <a:fillRect/>
+          </a:stretch>
+        </p:blipFill>
+        <p:spPr>
+          <a:xfrm>
+            <a:off x="5462369" y="2665745"/>
+            <a:ext cx="4330526" cy="1526510"/>
+          </a:xfrm>
+          <a:prstGeom prst="rect">
+            <a:avLst/>
+          </a:prstGeom>
+        </p:spPr>
+      </p:pic>
+      <p:sp>
+        <p:nvSpPr>
+          <p:cNvPr id="16" name="Rectangle 15">
+            <a:extLst>
+              <a:ext uri="{FF2B5EF4-FFF2-40B4-BE49-F238E27FC236}">
+                <a16:creationId xmlns:a16="http://schemas.microsoft.com/office/drawing/2014/main" id="{D4D9AAD4-B929-4AE3-A27C-651AF2069ED0}"/>
+              </a:ext>
+              <a:ext uri="{C183D7F6-B498-43B3-948B-1728B52AA6E4}">
+                <adec:decorative xmlns:adec="http://schemas.microsoft.com/office/drawing/2017/decorative" val="1"/>
+              </a:ext>
+            </a:extLst>
+          </p:cNvPr>
+          <p:cNvSpPr>
+            <a:spLocks noGrp="1" noRot="1" noChangeAspect="1" noMove="1" noResize="1" noEditPoints="1" noAdjustHandles="1" noChangeArrowheads="1" noChangeShapeType="1" noTextEdit="1"/>
+          </p:cNvSpPr>
+          <p:nvPr>
+            <p:extLst>
+              <p:ext uri="{386F3935-93C4-4BCD-93E2-E3B085C9AB24}">
+                <p16:designElem xmlns:p16="http://schemas.microsoft.com/office/powerpoint/2015/main" val="1"/>
+              </p:ext>
+            </p:extLst>
+          </p:nvPr>
+        </p:nvSpPr>
+        <p:spPr>
+          <a:xfrm>
+            <a:off x="10437812" y="0"/>
+            <a:ext cx="685800" cy="1143000"/>
+          </a:xfrm>
+          <a:prstGeom prst="rect">
+            <a:avLst/>
+          </a:prstGeom>
+          <a:solidFill>
+            <a:schemeClr val="accent1"/>
+          </a:solidFill>
+          <a:ln>
+            <a:noFill/>
+          </a:ln>
+        </p:spPr>
+        <p:style>
+          <a:lnRef idx="1">
+            <a:schemeClr val="accent1"/>
+          </a:lnRef>
+          <a:fillRef idx="3">
+            <a:schemeClr val="accent1"/>
+          </a:fillRef>
+          <a:effectRef idx="2">
+            <a:schemeClr val="accent1"/>
+          </a:effectRef>
+          <a:fontRef idx="minor">
+            <a:schemeClr val="lt1"/>
+          </a:fontRef>
+        </p:style>
+      </p:sp>
+    </p:spTree>
+    <p:extLst>
+      <p:ext uri="{BB962C8B-B14F-4D97-AF65-F5344CB8AC3E}">
+        <p14:creationId xmlns:p14="http://schemas.microsoft.com/office/powerpoint/2010/main" val="1643430516"/>
+      </p:ext>
+    </p:extLst>
+  </p:cSld>
+  <p:clrMapOvr>
+    <a:masterClrMapping/>
+  </p:clrMapOvr>
+</p:sld>
+</file>
+
+<file path=ppt/slides/slide14.xml><?xml version="1.0" encoding="utf-8"?>
+<p:sld xmlns:a="http://schemas.openxmlformats.org/drawingml/2006/main" xmlns:r="http://schemas.openxmlformats.org/officeDocument/2006/relationships" xmlns:p="http://schemas.openxmlformats.org/presentationml/2006/main">
+  <p:cSld>
+    <p:bg>
+      <p:bgPr>
+        <a:blipFill rotWithShape="1">
+          <a:blip r:embed="rId2">
+            <a:duotone>
+              <a:schemeClr val="bg2">
+                <a:shade val="69000"/>
+                <a:hueMod val="108000"/>
+                <a:satMod val="164000"/>
+                <a:lumMod val="74000"/>
+              </a:schemeClr>
+              <a:schemeClr val="bg2">
+                <a:tint val="96000"/>
+                <a:hueMod val="88000"/>
+                <a:satMod val="140000"/>
+                <a:lumMod val="132000"/>
+              </a:schemeClr>
+            </a:duotone>
+            <a:extLst/>
+          </a:blip>
+          <a:stretch/>
+        </a:blipFill>
+        <a:effectLst/>
+      </p:bgPr>
+    </p:bg>
+    <p:spTree>
+      <p:nvGrpSpPr>
+        <p:cNvPr id="1" name=""/>
+        <p:cNvGrpSpPr/>
+        <p:nvPr/>
+      </p:nvGrpSpPr>
+      <p:grpSpPr>
+        <a:xfrm>
+          <a:off x="0" y="0"/>
+          <a:ext cx="0" cy="0"/>
+          <a:chOff x="0" y="0"/>
+          <a:chExt cx="0" cy="0"/>
+        </a:xfrm>
+      </p:grpSpPr>
+      <p:sp>
+        <p:nvSpPr>
+          <p:cNvPr id="10" name="Rectangle 9">
+            <a:extLst>
+              <a:ext uri="{FF2B5EF4-FFF2-40B4-BE49-F238E27FC236}">
+                <a16:creationId xmlns:a16="http://schemas.microsoft.com/office/drawing/2014/main" id="{B77F70CF-51B7-4A07-A16B-70DFA49427F9}"/>
+              </a:ext>
+              <a:ext uri="{C183D7F6-B498-43B3-948B-1728B52AA6E4}">
+                <adec:decorative xmlns:adec="http://schemas.microsoft.com/office/drawing/2017/decorative" val="1"/>
+              </a:ext>
+            </a:extLst>
+          </p:cNvPr>
+          <p:cNvSpPr>
+            <a:spLocks noGrp="1" noRot="1" noChangeAspect="1" noMove="1" noResize="1" noEditPoints="1" noAdjustHandles="1" noChangeArrowheads="1" noChangeShapeType="1" noTextEdit="1"/>
+          </p:cNvSpPr>
+          <p:nvPr>
+            <p:extLst>
+              <p:ext uri="{386F3935-93C4-4BCD-93E2-E3B085C9AB24}">
+                <p16:designElem xmlns:p16="http://schemas.microsoft.com/office/powerpoint/2015/main" val="1"/>
+              </p:ext>
+            </p:extLst>
+          </p:nvPr>
+        </p:nvSpPr>
+        <p:spPr>
+          <a:xfrm>
+            <a:off x="0" y="0"/>
+            <a:ext cx="12192000" cy="6858000"/>
+          </a:xfrm>
+          <a:prstGeom prst="rect">
+            <a:avLst/>
+          </a:prstGeom>
+          <a:solidFill>
+            <a:schemeClr val="bg2"/>
+          </a:solidFill>
+          <a:ln>
+            <a:noFill/>
+          </a:ln>
+        </p:spPr>
+        <p:style>
+          <a:lnRef idx="2">
+            <a:schemeClr val="accent1">
+              <a:shade val="50000"/>
+            </a:schemeClr>
+          </a:lnRef>
+          <a:fillRef idx="1">
+            <a:schemeClr val="accent1"/>
+          </a:fillRef>
+          <a:effectRef idx="0">
+            <a:schemeClr val="accent1"/>
+          </a:effectRef>
+          <a:fontRef idx="minor">
+            <a:schemeClr val="lt1"/>
+          </a:fontRef>
+        </p:style>
+        <p:txBody>
+          <a:bodyPr rtlCol="0" anchor="ctr"/>
+          <a:lstStyle/>
+          <a:p>
+            <a:pPr algn="ctr"/>
+            <a:endParaRPr lang="en-US" dirty="0"/>
+          </a:p>
+        </p:txBody>
+      </p:sp>
+      <p:sp>
+        <p:nvSpPr>
+          <p:cNvPr id="12" name="Rectangle 11">
+            <a:extLst>
+              <a:ext uri="{FF2B5EF4-FFF2-40B4-BE49-F238E27FC236}">
+                <a16:creationId xmlns:a16="http://schemas.microsoft.com/office/drawing/2014/main" id="{C98594B0-DC7B-4BAF-B0F2-8557CBDE6BE6}"/>
+              </a:ext>
+              <a:ext uri="{C183D7F6-B498-43B3-948B-1728B52AA6E4}">
+                <adec:decorative xmlns:adec="http://schemas.microsoft.com/office/drawing/2017/decorative" val="1"/>
+              </a:ext>
+            </a:extLst>
+          </p:cNvPr>
+          <p:cNvSpPr>
+            <a:spLocks noGrp="1" noRot="1" noChangeAspect="1" noMove="1" noResize="1" noEditPoints="1" noAdjustHandles="1" noChangeArrowheads="1" noChangeShapeType="1" noTextEdit="1"/>
+          </p:cNvSpPr>
+          <p:nvPr>
+            <p:extLst>
+              <p:ext uri="{386F3935-93C4-4BCD-93E2-E3B085C9AB24}">
+                <p16:designElem xmlns:p16="http://schemas.microsoft.com/office/powerpoint/2015/main" val="1"/>
+              </p:ext>
+            </p:extLst>
+          </p:nvPr>
+        </p:nvSpPr>
+        <p:spPr>
+          <a:xfrm>
+            <a:off x="477012" y="480060"/>
+            <a:ext cx="4661461" cy="5897880"/>
+          </a:xfrm>
+          <a:prstGeom prst="rect">
+            <a:avLst/>
+          </a:prstGeom>
+          <a:solidFill>
+            <a:srgbClr val="FFFFFF"/>
+          </a:solidFill>
+          <a:ln w="22225">
+            <a:solidFill>
+              <a:schemeClr val="tx1">
+                <a:lumMod val="50000"/>
+                <a:lumOff val="50000"/>
+              </a:schemeClr>
+            </a:solidFill>
+          </a:ln>
+        </p:spPr>
+        <p:style>
+          <a:lnRef idx="2">
+            <a:schemeClr val="accent1">
+              <a:shade val="50000"/>
+            </a:schemeClr>
+          </a:lnRef>
+          <a:fillRef idx="1">
+            <a:schemeClr val="accent1"/>
+          </a:fillRef>
+          <a:effectRef idx="0">
+            <a:schemeClr val="accent1"/>
+          </a:effectRef>
+          <a:fontRef idx="minor">
+            <a:schemeClr val="lt1"/>
+          </a:fontRef>
+        </p:style>
+        <p:txBody>
+          <a:bodyPr rtlCol="0" anchor="ctr"/>
+          <a:lstStyle/>
+          <a:p>
+            <a:pPr algn="ctr"/>
+            <a:endParaRPr lang="en-US"/>
+          </a:p>
+        </p:txBody>
+      </p:sp>
+      <p:pic>
+        <p:nvPicPr>
+          <p:cNvPr id="5" name="Picture 4">
+            <a:extLst>
+              <a:ext uri="{FF2B5EF4-FFF2-40B4-BE49-F238E27FC236}">
+                <a16:creationId xmlns:a16="http://schemas.microsoft.com/office/drawing/2014/main" id="{D3E30E6B-3333-094A-904F-4B10966C53F7}"/>
+              </a:ext>
+            </a:extLst>
+          </p:cNvPr>
+          <p:cNvPicPr>
+            <a:picLocks noChangeAspect="1"/>
+          </p:cNvPicPr>
+          <p:nvPr/>
+        </p:nvPicPr>
+        <p:blipFill>
+          <a:blip r:embed="rId3"/>
+          <a:stretch>
+            <a:fillRect/>
+          </a:stretch>
+        </p:blipFill>
+        <p:spPr>
+          <a:xfrm>
+            <a:off x="844407" y="643467"/>
+            <a:ext cx="3927600" cy="5571066"/>
+          </a:xfrm>
+          <a:prstGeom prst="rect">
+            <a:avLst/>
+          </a:prstGeom>
+        </p:spPr>
+      </p:pic>
+      <p:sp>
+        <p:nvSpPr>
+          <p:cNvPr id="14" name="Rectangle 13">
+            <a:extLst>
+              <a:ext uri="{FF2B5EF4-FFF2-40B4-BE49-F238E27FC236}">
+                <a16:creationId xmlns:a16="http://schemas.microsoft.com/office/drawing/2014/main" id="{27A76E6C-02DD-4FDA-9F96-21BD3F4E45B7}"/>
+              </a:ext>
+              <a:ext uri="{C183D7F6-B498-43B3-948B-1728B52AA6E4}">
+                <adec:decorative xmlns:adec="http://schemas.microsoft.com/office/drawing/2017/decorative" val="1"/>
+              </a:ext>
+            </a:extLst>
+          </p:cNvPr>
+          <p:cNvSpPr>
+            <a:spLocks noGrp="1" noRot="1" noChangeAspect="1" noMove="1" noResize="1" noEditPoints="1" noAdjustHandles="1" noChangeArrowheads="1" noChangeShapeType="1" noTextEdit="1"/>
+          </p:cNvSpPr>
+          <p:nvPr>
+            <p:extLst>
+              <p:ext uri="{386F3935-93C4-4BCD-93E2-E3B085C9AB24}">
+                <p16:designElem xmlns:p16="http://schemas.microsoft.com/office/powerpoint/2015/main" val="1"/>
+              </p:ext>
+            </p:extLst>
+          </p:nvPr>
+        </p:nvSpPr>
+        <p:spPr>
+          <a:xfrm>
+            <a:off x="5299341" y="480060"/>
+            <a:ext cx="4661460" cy="5897880"/>
+          </a:xfrm>
+          <a:prstGeom prst="rect">
+            <a:avLst/>
+          </a:prstGeom>
+          <a:solidFill>
+            <a:srgbClr val="FFFFFF"/>
+          </a:solidFill>
+          <a:ln w="22225">
+            <a:solidFill>
+              <a:schemeClr val="tx1">
+                <a:lumMod val="50000"/>
+                <a:lumOff val="50000"/>
+              </a:schemeClr>
+            </a:solidFill>
+          </a:ln>
+        </p:spPr>
+        <p:style>
+          <a:lnRef idx="2">
+            <a:schemeClr val="accent1">
+              <a:shade val="50000"/>
+            </a:schemeClr>
+          </a:lnRef>
+          <a:fillRef idx="1">
+            <a:schemeClr val="accent1"/>
+          </a:fillRef>
+          <a:effectRef idx="0">
+            <a:schemeClr val="accent1"/>
+          </a:effectRef>
+          <a:fontRef idx="minor">
+            <a:schemeClr val="lt1"/>
+          </a:fontRef>
+        </p:style>
+        <p:txBody>
+          <a:bodyPr rtlCol="0" anchor="ctr"/>
+          <a:lstStyle/>
+          <a:p>
+            <a:pPr algn="ctr"/>
+            <a:endParaRPr lang="en-US"/>
+          </a:p>
+        </p:txBody>
+      </p:sp>
+      <p:pic>
+        <p:nvPicPr>
+          <p:cNvPr id="3" name="Picture 2">
+            <a:extLst>
+              <a:ext uri="{FF2B5EF4-FFF2-40B4-BE49-F238E27FC236}">
+                <a16:creationId xmlns:a16="http://schemas.microsoft.com/office/drawing/2014/main" id="{A731726A-3567-DC46-AF53-5EF5EAE86350}"/>
+              </a:ext>
+            </a:extLst>
+          </p:cNvPr>
+          <p:cNvPicPr>
+            <a:picLocks noChangeAspect="1"/>
+          </p:cNvPicPr>
+          <p:nvPr/>
+        </p:nvPicPr>
+        <p:blipFill>
+          <a:blip r:embed="rId4"/>
+          <a:stretch>
+            <a:fillRect/>
+          </a:stretch>
+        </p:blipFill>
+        <p:spPr>
+          <a:xfrm>
+            <a:off x="5462369" y="2568308"/>
+            <a:ext cx="4330526" cy="1721383"/>
+          </a:xfrm>
+          <a:prstGeom prst="rect">
+            <a:avLst/>
+          </a:prstGeom>
+        </p:spPr>
+      </p:pic>
+      <p:sp>
+        <p:nvSpPr>
+          <p:cNvPr id="16" name="Rectangle 15">
+            <a:extLst>
+              <a:ext uri="{FF2B5EF4-FFF2-40B4-BE49-F238E27FC236}">
+                <a16:creationId xmlns:a16="http://schemas.microsoft.com/office/drawing/2014/main" id="{D4D9AAD4-B929-4AE3-A27C-651AF2069ED0}"/>
+              </a:ext>
+              <a:ext uri="{C183D7F6-B498-43B3-948B-1728B52AA6E4}">
+                <adec:decorative xmlns:adec="http://schemas.microsoft.com/office/drawing/2017/decorative" val="1"/>
+              </a:ext>
+            </a:extLst>
+          </p:cNvPr>
+          <p:cNvSpPr>
+            <a:spLocks noGrp="1" noRot="1" noChangeAspect="1" noMove="1" noResize="1" noEditPoints="1" noAdjustHandles="1" noChangeArrowheads="1" noChangeShapeType="1" noTextEdit="1"/>
+          </p:cNvSpPr>
+          <p:nvPr>
+            <p:extLst>
+              <p:ext uri="{386F3935-93C4-4BCD-93E2-E3B085C9AB24}">
+                <p16:designElem xmlns:p16="http://schemas.microsoft.com/office/powerpoint/2015/main" val="1"/>
+              </p:ext>
+            </p:extLst>
+          </p:nvPr>
+        </p:nvSpPr>
+        <p:spPr>
+          <a:xfrm>
+            <a:off x="10437812" y="0"/>
+            <a:ext cx="685800" cy="1143000"/>
+          </a:xfrm>
+          <a:prstGeom prst="rect">
+            <a:avLst/>
+          </a:prstGeom>
+          <a:solidFill>
+            <a:schemeClr val="accent1"/>
+          </a:solidFill>
+          <a:ln>
+            <a:noFill/>
+          </a:ln>
+        </p:spPr>
+        <p:style>
+          <a:lnRef idx="1">
+            <a:schemeClr val="accent1"/>
+          </a:lnRef>
+          <a:fillRef idx="3">
+            <a:schemeClr val="accent1"/>
+          </a:fillRef>
+          <a:effectRef idx="2">
+            <a:schemeClr val="accent1"/>
+          </a:effectRef>
+          <a:fontRef idx="minor">
+            <a:schemeClr val="lt1"/>
+          </a:fontRef>
+        </p:style>
+      </p:sp>
+    </p:spTree>
+    <p:extLst>
+      <p:ext uri="{BB962C8B-B14F-4D97-AF65-F5344CB8AC3E}">
+        <p14:creationId xmlns:p14="http://schemas.microsoft.com/office/powerpoint/2010/main" val="2894944350"/>
+      </p:ext>
+    </p:extLst>
+  </p:cSld>
+  <p:clrMapOvr>
+    <a:masterClrMapping/>
+  </p:clrMapOvr>
+</p:sld>
+</file>
+
+<file path=ppt/slides/slide15.xml><?xml version="1.0" encoding="utf-8"?>
+<p:sld xmlns:a="http://schemas.openxmlformats.org/drawingml/2006/main" xmlns:r="http://schemas.openxmlformats.org/officeDocument/2006/relationships" xmlns:p="http://schemas.openxmlformats.org/presentationml/2006/main">
+  <p:cSld>
+    <p:spTree>
+      <p:nvGrpSpPr>
+        <p:cNvPr id="1" name=""/>
+        <p:cNvGrpSpPr/>
+        <p:nvPr/>
+      </p:nvGrpSpPr>
+      <p:grpSpPr>
+        <a:xfrm>
+          <a:off x="0" y="0"/>
+          <a:ext cx="0" cy="0"/>
+          <a:chOff x="0" y="0"/>
+          <a:chExt cx="0" cy="0"/>
+        </a:xfrm>
+      </p:grpSpPr>
+    </p:spTree>
+    <p:extLst>
+      <p:ext uri="{BB962C8B-B14F-4D97-AF65-F5344CB8AC3E}">
+        <p14:creationId xmlns:p14="http://schemas.microsoft.com/office/powerpoint/2010/main" val="4002620861"/>
+      </p:ext>
+    </p:extLst>
+  </p:cSld>
+  <p:clrMapOvr>
+    <a:masterClrMapping/>
+  </p:clrMapOvr>
+</p:sld>
+</file>
+
+<file path=ppt/slides/slide16.xml><?xml version="1.0" encoding="utf-8"?>
 <p:sld xmlns:a="http://schemas.openxmlformats.org/drawingml/2006/main" xmlns:r="http://schemas.openxmlformats.org/officeDocument/2006/relationships" xmlns:p="http://schemas.openxmlformats.org/presentationml/2006/main">
   <p:cSld>
     <p:bg>
@@ -10713,36 +12601,6 @@
           <a:chExt cx="0" cy="0"/>
         </a:xfrm>
       </p:grpSpPr>
-    </p:spTree>
-    <p:extLst>
-      <p:ext uri="{BB962C8B-B14F-4D97-AF65-F5344CB8AC3E}">
-        <p14:creationId xmlns:p14="http://schemas.microsoft.com/office/powerpoint/2010/main" val="4244630367"/>
-      </p:ext>
-    </p:extLst>
-  </p:cSld>
-  <p:clrMapOvr>
-    <a:masterClrMapping/>
-  </p:clrMapOvr>
-</p:sld>
-</file>
-
-<file path=ppt/slides/slide8.xml><?xml version="1.0" encoding="utf-8"?>
-<p:sld xmlns:a="http://schemas.openxmlformats.org/drawingml/2006/main" xmlns:r="http://schemas.openxmlformats.org/officeDocument/2006/relationships" xmlns:p="http://schemas.openxmlformats.org/presentationml/2006/main">
-  <p:cSld>
-    <p:spTree>
-      <p:nvGrpSpPr>
-        <p:cNvPr id="1" name=""/>
-        <p:cNvGrpSpPr/>
-        <p:nvPr/>
-      </p:nvGrpSpPr>
-      <p:grpSpPr>
-        <a:xfrm>
-          <a:off x="0" y="0"/>
-          <a:ext cx="0" cy="0"/>
-          <a:chOff x="0" y="0"/>
-          <a:chExt cx="0" cy="0"/>
-        </a:xfrm>
-      </p:grpSpPr>
       <p:sp>
         <p:nvSpPr>
           <p:cNvPr id="2" name="타원 1"/>
@@ -10751,7 +12609,7 @@
         </p:nvSpPr>
         <p:spPr>
           <a:xfrm>
-            <a:off x="7402881" y="-816429"/>
+            <a:off x="7276421" y="-1244446"/>
             <a:ext cx="6998919" cy="8870665"/>
           </a:xfrm>
           <a:prstGeom prst="ellipse">
@@ -10815,7 +12673,7 @@
         </p:blipFill>
         <p:spPr>
           <a:xfrm>
-            <a:off x="820698" y="1583872"/>
+            <a:off x="6019234" y="2128621"/>
             <a:ext cx="4163006" cy="1848108"/>
           </a:xfrm>
           <a:prstGeom prst="rect">
@@ -10845,7 +12703,7 @@
         </p:blipFill>
         <p:spPr>
           <a:xfrm>
-            <a:off x="5509909" y="1583872"/>
+            <a:off x="316281" y="1078034"/>
             <a:ext cx="5257800" cy="4546600"/>
           </a:xfrm>
           <a:prstGeom prst="rect">
@@ -10866,9 +12724,34 @@
 </p:sld>
 </file>
 
-<file path=ppt/slides/slide9.xml><?xml version="1.0" encoding="utf-8"?>
+<file path=ppt/slides/slide8.xml><?xml version="1.0" encoding="utf-8"?>
 <p:sld xmlns:a="http://schemas.openxmlformats.org/drawingml/2006/main" xmlns:r="http://schemas.openxmlformats.org/officeDocument/2006/relationships" xmlns:p="http://schemas.openxmlformats.org/presentationml/2006/main">
   <p:cSld>
+    <p:bg>
+      <p:bgPr>
+        <a:blipFill rotWithShape="1">
+          <a:blip r:embed="rId2">
+            <a:duotone>
+              <a:schemeClr val="bg2">
+                <a:shade val="69000"/>
+                <a:hueMod val="108000"/>
+                <a:satMod val="164000"/>
+                <a:lumMod val="74000"/>
+              </a:schemeClr>
+              <a:schemeClr val="bg2">
+                <a:tint val="96000"/>
+                <a:hueMod val="88000"/>
+                <a:satMod val="140000"/>
+                <a:lumMod val="132000"/>
+              </a:schemeClr>
+            </a:duotone>
+            <a:extLst/>
+          </a:blip>
+          <a:stretch/>
+        </a:blipFill>
+        <a:effectLst/>
+      </p:bgPr>
+    </p:bg>
     <p:spTree>
       <p:nvGrpSpPr>
         <p:cNvPr id="1" name=""/>
@@ -10883,10 +12766,749 @@
           <a:chExt cx="0" cy="0"/>
         </a:xfrm>
       </p:grpSpPr>
+      <p:sp>
+        <p:nvSpPr>
+          <p:cNvPr id="22" name="Rectangle 9">
+            <a:extLst>
+              <a:ext uri="{FF2B5EF4-FFF2-40B4-BE49-F238E27FC236}">
+                <a16:creationId xmlns:a16="http://schemas.microsoft.com/office/drawing/2014/main" id="{B77F70CF-51B7-4A07-A16B-70DFA49427F9}"/>
+              </a:ext>
+              <a:ext uri="{C183D7F6-B498-43B3-948B-1728B52AA6E4}">
+                <adec:decorative xmlns:adec="http://schemas.microsoft.com/office/drawing/2017/decorative" val="1"/>
+              </a:ext>
+            </a:extLst>
+          </p:cNvPr>
+          <p:cNvSpPr>
+            <a:spLocks noGrp="1" noRot="1" noChangeAspect="1" noMove="1" noResize="1" noEditPoints="1" noAdjustHandles="1" noChangeArrowheads="1" noChangeShapeType="1" noTextEdit="1"/>
+          </p:cNvSpPr>
+          <p:nvPr>
+            <p:extLst>
+              <p:ext uri="{386F3935-93C4-4BCD-93E2-E3B085C9AB24}">
+                <p16:designElem xmlns:p16="http://schemas.microsoft.com/office/powerpoint/2015/main" val="1"/>
+              </p:ext>
+            </p:extLst>
+          </p:nvPr>
+        </p:nvSpPr>
+        <p:spPr>
+          <a:xfrm>
+            <a:off x="0" y="0"/>
+            <a:ext cx="12192000" cy="6858000"/>
+          </a:xfrm>
+          <a:prstGeom prst="rect">
+            <a:avLst/>
+          </a:prstGeom>
+          <a:solidFill>
+            <a:schemeClr val="bg2"/>
+          </a:solidFill>
+          <a:ln>
+            <a:noFill/>
+          </a:ln>
+        </p:spPr>
+        <p:style>
+          <a:lnRef idx="2">
+            <a:schemeClr val="accent1">
+              <a:shade val="50000"/>
+            </a:schemeClr>
+          </a:lnRef>
+          <a:fillRef idx="1">
+            <a:schemeClr val="accent1"/>
+          </a:fillRef>
+          <a:effectRef idx="0">
+            <a:schemeClr val="accent1"/>
+          </a:effectRef>
+          <a:fontRef idx="minor">
+            <a:schemeClr val="lt1"/>
+          </a:fontRef>
+        </p:style>
+        <p:txBody>
+          <a:bodyPr rtlCol="0" anchor="ctr"/>
+          <a:lstStyle/>
+          <a:p>
+            <a:pPr algn="ctr"/>
+            <a:endParaRPr lang="en-US" dirty="0"/>
+          </a:p>
+        </p:txBody>
+      </p:sp>
+      <p:sp>
+        <p:nvSpPr>
+          <p:cNvPr id="23" name="Rectangle 11">
+            <a:extLst>
+              <a:ext uri="{FF2B5EF4-FFF2-40B4-BE49-F238E27FC236}">
+                <a16:creationId xmlns:a16="http://schemas.microsoft.com/office/drawing/2014/main" id="{C98594B0-DC7B-4BAF-B0F2-8557CBDE6BE6}"/>
+              </a:ext>
+              <a:ext uri="{C183D7F6-B498-43B3-948B-1728B52AA6E4}">
+                <adec:decorative xmlns:adec="http://schemas.microsoft.com/office/drawing/2017/decorative" val="1"/>
+              </a:ext>
+            </a:extLst>
+          </p:cNvPr>
+          <p:cNvSpPr>
+            <a:spLocks noGrp="1" noRot="1" noChangeAspect="1" noMove="1" noResize="1" noEditPoints="1" noAdjustHandles="1" noChangeArrowheads="1" noChangeShapeType="1" noTextEdit="1"/>
+          </p:cNvSpPr>
+          <p:nvPr>
+            <p:extLst>
+              <p:ext uri="{386F3935-93C4-4BCD-93E2-E3B085C9AB24}">
+                <p16:designElem xmlns:p16="http://schemas.microsoft.com/office/powerpoint/2015/main" val="1"/>
+              </p:ext>
+            </p:extLst>
+          </p:nvPr>
+        </p:nvSpPr>
+        <p:spPr>
+          <a:xfrm>
+            <a:off x="477012" y="480060"/>
+            <a:ext cx="4661461" cy="5897880"/>
+          </a:xfrm>
+          <a:prstGeom prst="rect">
+            <a:avLst/>
+          </a:prstGeom>
+          <a:solidFill>
+            <a:srgbClr val="FFFFFF"/>
+          </a:solidFill>
+          <a:ln w="22225">
+            <a:solidFill>
+              <a:schemeClr val="tx1">
+                <a:lumMod val="50000"/>
+                <a:lumOff val="50000"/>
+              </a:schemeClr>
+            </a:solidFill>
+          </a:ln>
+        </p:spPr>
+        <p:style>
+          <a:lnRef idx="2">
+            <a:schemeClr val="accent1">
+              <a:shade val="50000"/>
+            </a:schemeClr>
+          </a:lnRef>
+          <a:fillRef idx="1">
+            <a:schemeClr val="accent1"/>
+          </a:fillRef>
+          <a:effectRef idx="0">
+            <a:schemeClr val="accent1"/>
+          </a:effectRef>
+          <a:fontRef idx="minor">
+            <a:schemeClr val="lt1"/>
+          </a:fontRef>
+        </p:style>
+        <p:txBody>
+          <a:bodyPr rtlCol="0" anchor="ctr"/>
+          <a:lstStyle/>
+          <a:p>
+            <a:pPr algn="ctr"/>
+            <a:endParaRPr lang="en-US"/>
+          </a:p>
+        </p:txBody>
+      </p:sp>
+      <p:pic>
+        <p:nvPicPr>
+          <p:cNvPr id="5" name="Picture 4">
+            <a:extLst>
+              <a:ext uri="{FF2B5EF4-FFF2-40B4-BE49-F238E27FC236}">
+                <a16:creationId xmlns:a16="http://schemas.microsoft.com/office/drawing/2014/main" id="{BD9A3DBB-F945-4144-AFFE-879057D3DFC8}"/>
+              </a:ext>
+            </a:extLst>
+          </p:cNvPr>
+          <p:cNvPicPr>
+            <a:picLocks noChangeAspect="1"/>
+          </p:cNvPicPr>
+          <p:nvPr/>
+        </p:nvPicPr>
+        <p:blipFill>
+          <a:blip r:embed="rId3"/>
+          <a:stretch>
+            <a:fillRect/>
+          </a:stretch>
+        </p:blipFill>
+        <p:spPr>
+          <a:xfrm>
+            <a:off x="1310983" y="643467"/>
+            <a:ext cx="2994447" cy="5571066"/>
+          </a:xfrm>
+          <a:prstGeom prst="rect">
+            <a:avLst/>
+          </a:prstGeom>
+        </p:spPr>
+      </p:pic>
+      <p:sp>
+        <p:nvSpPr>
+          <p:cNvPr id="24" name="Rectangle 13">
+            <a:extLst>
+              <a:ext uri="{FF2B5EF4-FFF2-40B4-BE49-F238E27FC236}">
+                <a16:creationId xmlns:a16="http://schemas.microsoft.com/office/drawing/2014/main" id="{27A76E6C-02DD-4FDA-9F96-21BD3F4E45B7}"/>
+              </a:ext>
+              <a:ext uri="{C183D7F6-B498-43B3-948B-1728B52AA6E4}">
+                <adec:decorative xmlns:adec="http://schemas.microsoft.com/office/drawing/2017/decorative" val="1"/>
+              </a:ext>
+            </a:extLst>
+          </p:cNvPr>
+          <p:cNvSpPr>
+            <a:spLocks noGrp="1" noRot="1" noChangeAspect="1" noMove="1" noResize="1" noEditPoints="1" noAdjustHandles="1" noChangeArrowheads="1" noChangeShapeType="1" noTextEdit="1"/>
+          </p:cNvSpPr>
+          <p:nvPr>
+            <p:extLst>
+              <p:ext uri="{386F3935-93C4-4BCD-93E2-E3B085C9AB24}">
+                <p16:designElem xmlns:p16="http://schemas.microsoft.com/office/powerpoint/2015/main" val="1"/>
+              </p:ext>
+            </p:extLst>
+          </p:nvPr>
+        </p:nvSpPr>
+        <p:spPr>
+          <a:xfrm>
+            <a:off x="5299341" y="480060"/>
+            <a:ext cx="4661460" cy="5897880"/>
+          </a:xfrm>
+          <a:prstGeom prst="rect">
+            <a:avLst/>
+          </a:prstGeom>
+          <a:solidFill>
+            <a:srgbClr val="FFFFFF"/>
+          </a:solidFill>
+          <a:ln w="22225">
+            <a:solidFill>
+              <a:schemeClr val="tx1">
+                <a:lumMod val="50000"/>
+                <a:lumOff val="50000"/>
+              </a:schemeClr>
+            </a:solidFill>
+          </a:ln>
+        </p:spPr>
+        <p:style>
+          <a:lnRef idx="2">
+            <a:schemeClr val="accent1">
+              <a:shade val="50000"/>
+            </a:schemeClr>
+          </a:lnRef>
+          <a:fillRef idx="1">
+            <a:schemeClr val="accent1"/>
+          </a:fillRef>
+          <a:effectRef idx="0">
+            <a:schemeClr val="accent1"/>
+          </a:effectRef>
+          <a:fontRef idx="minor">
+            <a:schemeClr val="lt1"/>
+          </a:fontRef>
+        </p:style>
+        <p:txBody>
+          <a:bodyPr rtlCol="0" anchor="ctr"/>
+          <a:lstStyle/>
+          <a:p>
+            <a:pPr algn="ctr"/>
+            <a:endParaRPr lang="en-US"/>
+          </a:p>
+        </p:txBody>
+      </p:sp>
+      <p:pic>
+        <p:nvPicPr>
+          <p:cNvPr id="3" name="Picture 2">
+            <a:extLst>
+              <a:ext uri="{FF2B5EF4-FFF2-40B4-BE49-F238E27FC236}">
+                <a16:creationId xmlns:a16="http://schemas.microsoft.com/office/drawing/2014/main" id="{7AEEC757-1BBD-514B-9632-F13D49F05C9E}"/>
+              </a:ext>
+            </a:extLst>
+          </p:cNvPr>
+          <p:cNvPicPr>
+            <a:picLocks noChangeAspect="1"/>
+          </p:cNvPicPr>
+          <p:nvPr/>
+        </p:nvPicPr>
+        <p:blipFill>
+          <a:blip r:embed="rId4"/>
+          <a:stretch>
+            <a:fillRect/>
+          </a:stretch>
+        </p:blipFill>
+        <p:spPr>
+          <a:xfrm>
+            <a:off x="5462369" y="2617026"/>
+            <a:ext cx="4330526" cy="1623947"/>
+          </a:xfrm>
+          <a:prstGeom prst="rect">
+            <a:avLst/>
+          </a:prstGeom>
+        </p:spPr>
+      </p:pic>
+      <p:sp>
+        <p:nvSpPr>
+          <p:cNvPr id="25" name="Rectangle 15">
+            <a:extLst>
+              <a:ext uri="{FF2B5EF4-FFF2-40B4-BE49-F238E27FC236}">
+                <a16:creationId xmlns:a16="http://schemas.microsoft.com/office/drawing/2014/main" id="{D4D9AAD4-B929-4AE3-A27C-651AF2069ED0}"/>
+              </a:ext>
+              <a:ext uri="{C183D7F6-B498-43B3-948B-1728B52AA6E4}">
+                <adec:decorative xmlns:adec="http://schemas.microsoft.com/office/drawing/2017/decorative" val="1"/>
+              </a:ext>
+            </a:extLst>
+          </p:cNvPr>
+          <p:cNvSpPr>
+            <a:spLocks noGrp="1" noRot="1" noChangeAspect="1" noMove="1" noResize="1" noEditPoints="1" noAdjustHandles="1" noChangeArrowheads="1" noChangeShapeType="1" noTextEdit="1"/>
+          </p:cNvSpPr>
+          <p:nvPr>
+            <p:extLst>
+              <p:ext uri="{386F3935-93C4-4BCD-93E2-E3B085C9AB24}">
+                <p16:designElem xmlns:p16="http://schemas.microsoft.com/office/powerpoint/2015/main" val="1"/>
+              </p:ext>
+            </p:extLst>
+          </p:nvPr>
+        </p:nvSpPr>
+        <p:spPr>
+          <a:xfrm>
+            <a:off x="10437812" y="0"/>
+            <a:ext cx="685800" cy="1143000"/>
+          </a:xfrm>
+          <a:prstGeom prst="rect">
+            <a:avLst/>
+          </a:prstGeom>
+          <a:solidFill>
+            <a:schemeClr val="accent1"/>
+          </a:solidFill>
+          <a:ln>
+            <a:noFill/>
+          </a:ln>
+        </p:spPr>
+        <p:style>
+          <a:lnRef idx="1">
+            <a:schemeClr val="accent1"/>
+          </a:lnRef>
+          <a:fillRef idx="3">
+            <a:schemeClr val="accent1"/>
+          </a:fillRef>
+          <a:effectRef idx="2">
+            <a:schemeClr val="accent1"/>
+          </a:effectRef>
+          <a:fontRef idx="minor">
+            <a:schemeClr val="lt1"/>
+          </a:fontRef>
+        </p:style>
+      </p:sp>
     </p:spTree>
     <p:extLst>
       <p:ext uri="{BB962C8B-B14F-4D97-AF65-F5344CB8AC3E}">
         <p14:creationId xmlns:p14="http://schemas.microsoft.com/office/powerpoint/2010/main" val="1176609989"/>
+      </p:ext>
+    </p:extLst>
+  </p:cSld>
+  <p:clrMapOvr>
+    <a:masterClrMapping/>
+  </p:clrMapOvr>
+</p:sld>
+</file>
+
+<file path=ppt/slides/slide9.xml><?xml version="1.0" encoding="utf-8"?>
+<p:sld xmlns:a="http://schemas.openxmlformats.org/drawingml/2006/main" xmlns:r="http://schemas.openxmlformats.org/officeDocument/2006/relationships" xmlns:p="http://schemas.openxmlformats.org/presentationml/2006/main">
+  <p:cSld>
+    <p:bg>
+      <p:bgPr>
+        <a:blipFill rotWithShape="1">
+          <a:blip r:embed="rId2">
+            <a:duotone>
+              <a:schemeClr val="bg2">
+                <a:shade val="69000"/>
+                <a:hueMod val="108000"/>
+                <a:satMod val="164000"/>
+                <a:lumMod val="74000"/>
+              </a:schemeClr>
+              <a:schemeClr val="bg2">
+                <a:tint val="96000"/>
+                <a:hueMod val="88000"/>
+                <a:satMod val="140000"/>
+                <a:lumMod val="132000"/>
+              </a:schemeClr>
+            </a:duotone>
+            <a:extLst/>
+          </a:blip>
+          <a:stretch/>
+        </a:blipFill>
+        <a:effectLst/>
+      </p:bgPr>
+    </p:bg>
+    <p:spTree>
+      <p:nvGrpSpPr>
+        <p:cNvPr id="1" name=""/>
+        <p:cNvGrpSpPr/>
+        <p:nvPr/>
+      </p:nvGrpSpPr>
+      <p:grpSpPr>
+        <a:xfrm>
+          <a:off x="0" y="0"/>
+          <a:ext cx="0" cy="0"/>
+          <a:chOff x="0" y="0"/>
+          <a:chExt cx="0" cy="0"/>
+        </a:xfrm>
+      </p:grpSpPr>
+      <p:sp>
+        <p:nvSpPr>
+          <p:cNvPr id="10" name="Rectangle 9">
+            <a:extLst>
+              <a:ext uri="{FF2B5EF4-FFF2-40B4-BE49-F238E27FC236}">
+                <a16:creationId xmlns:a16="http://schemas.microsoft.com/office/drawing/2014/main" id="{B77F70CF-51B7-4A07-A16B-70DFA49427F9}"/>
+              </a:ext>
+              <a:ext uri="{C183D7F6-B498-43B3-948B-1728B52AA6E4}">
+                <adec:decorative xmlns:adec="http://schemas.microsoft.com/office/drawing/2017/decorative" val="1"/>
+              </a:ext>
+            </a:extLst>
+          </p:cNvPr>
+          <p:cNvSpPr>
+            <a:spLocks noGrp="1" noRot="1" noChangeAspect="1" noMove="1" noResize="1" noEditPoints="1" noAdjustHandles="1" noChangeArrowheads="1" noChangeShapeType="1" noTextEdit="1"/>
+          </p:cNvSpPr>
+          <p:nvPr>
+            <p:extLst>
+              <p:ext uri="{386F3935-93C4-4BCD-93E2-E3B085C9AB24}">
+                <p16:designElem xmlns:p16="http://schemas.microsoft.com/office/powerpoint/2015/main" val="1"/>
+              </p:ext>
+            </p:extLst>
+          </p:nvPr>
+        </p:nvSpPr>
+        <p:spPr>
+          <a:xfrm>
+            <a:off x="0" y="0"/>
+            <a:ext cx="12192000" cy="6858000"/>
+          </a:xfrm>
+          <a:prstGeom prst="rect">
+            <a:avLst/>
+          </a:prstGeom>
+          <a:solidFill>
+            <a:schemeClr val="bg2"/>
+          </a:solidFill>
+          <a:ln>
+            <a:noFill/>
+          </a:ln>
+        </p:spPr>
+        <p:style>
+          <a:lnRef idx="2">
+            <a:schemeClr val="accent1">
+              <a:shade val="50000"/>
+            </a:schemeClr>
+          </a:lnRef>
+          <a:fillRef idx="1">
+            <a:schemeClr val="accent1"/>
+          </a:fillRef>
+          <a:effectRef idx="0">
+            <a:schemeClr val="accent1"/>
+          </a:effectRef>
+          <a:fontRef idx="minor">
+            <a:schemeClr val="lt1"/>
+          </a:fontRef>
+        </p:style>
+        <p:txBody>
+          <a:bodyPr rtlCol="0" anchor="ctr"/>
+          <a:lstStyle/>
+          <a:p>
+            <a:pPr algn="ctr"/>
+            <a:endParaRPr lang="en-US" dirty="0"/>
+          </a:p>
+        </p:txBody>
+      </p:sp>
+      <p:sp>
+        <p:nvSpPr>
+          <p:cNvPr id="12" name="Rectangle 11">
+            <a:extLst>
+              <a:ext uri="{FF2B5EF4-FFF2-40B4-BE49-F238E27FC236}">
+                <a16:creationId xmlns:a16="http://schemas.microsoft.com/office/drawing/2014/main" id="{C98594B0-DC7B-4BAF-B0F2-8557CBDE6BE6}"/>
+              </a:ext>
+              <a:ext uri="{C183D7F6-B498-43B3-948B-1728B52AA6E4}">
+                <adec:decorative xmlns:adec="http://schemas.microsoft.com/office/drawing/2017/decorative" val="1"/>
+              </a:ext>
+            </a:extLst>
+          </p:cNvPr>
+          <p:cNvSpPr>
+            <a:spLocks noGrp="1" noRot="1" noChangeAspect="1" noMove="1" noResize="1" noEditPoints="1" noAdjustHandles="1" noChangeArrowheads="1" noChangeShapeType="1" noTextEdit="1"/>
+          </p:cNvSpPr>
+          <p:nvPr>
+            <p:extLst>
+              <p:ext uri="{386F3935-93C4-4BCD-93E2-E3B085C9AB24}">
+                <p16:designElem xmlns:p16="http://schemas.microsoft.com/office/powerpoint/2015/main" val="1"/>
+              </p:ext>
+            </p:extLst>
+          </p:nvPr>
+        </p:nvSpPr>
+        <p:spPr>
+          <a:xfrm>
+            <a:off x="477012" y="480060"/>
+            <a:ext cx="4661461" cy="5897880"/>
+          </a:xfrm>
+          <a:prstGeom prst="rect">
+            <a:avLst/>
+          </a:prstGeom>
+          <a:solidFill>
+            <a:srgbClr val="FFFFFF"/>
+          </a:solidFill>
+          <a:ln w="22225">
+            <a:solidFill>
+              <a:schemeClr val="tx1">
+                <a:lumMod val="50000"/>
+                <a:lumOff val="50000"/>
+              </a:schemeClr>
+            </a:solidFill>
+          </a:ln>
+        </p:spPr>
+        <p:style>
+          <a:lnRef idx="2">
+            <a:schemeClr val="accent1">
+              <a:shade val="50000"/>
+            </a:schemeClr>
+          </a:lnRef>
+          <a:fillRef idx="1">
+            <a:schemeClr val="accent1"/>
+          </a:fillRef>
+          <a:effectRef idx="0">
+            <a:schemeClr val="accent1"/>
+          </a:effectRef>
+          <a:fontRef idx="minor">
+            <a:schemeClr val="lt1"/>
+          </a:fontRef>
+        </p:style>
+        <p:txBody>
+          <a:bodyPr rtlCol="0" anchor="ctr"/>
+          <a:lstStyle/>
+          <a:p>
+            <a:pPr algn="ctr"/>
+            <a:endParaRPr lang="en-US"/>
+          </a:p>
+        </p:txBody>
+      </p:sp>
+      <p:pic>
+        <p:nvPicPr>
+          <p:cNvPr id="3" name="Picture 2">
+            <a:extLst>
+              <a:ext uri="{FF2B5EF4-FFF2-40B4-BE49-F238E27FC236}">
+                <a16:creationId xmlns:a16="http://schemas.microsoft.com/office/drawing/2014/main" id="{87CCD4F9-0A03-A847-9DA2-C11F475367D9}"/>
+              </a:ext>
+            </a:extLst>
+          </p:cNvPr>
+          <p:cNvPicPr>
+            <a:picLocks noChangeAspect="1"/>
+          </p:cNvPicPr>
+          <p:nvPr/>
+        </p:nvPicPr>
+        <p:blipFill>
+          <a:blip r:embed="rId3"/>
+          <a:stretch>
+            <a:fillRect/>
+          </a:stretch>
+        </p:blipFill>
+        <p:spPr>
+          <a:xfrm>
+            <a:off x="643001" y="865764"/>
+            <a:ext cx="4329482" cy="1969913"/>
+          </a:xfrm>
+          <a:prstGeom prst="rect">
+            <a:avLst/>
+          </a:prstGeom>
+        </p:spPr>
+      </p:pic>
+      <p:sp>
+        <p:nvSpPr>
+          <p:cNvPr id="14" name="Rectangle 13">
+            <a:extLst>
+              <a:ext uri="{FF2B5EF4-FFF2-40B4-BE49-F238E27FC236}">
+                <a16:creationId xmlns:a16="http://schemas.microsoft.com/office/drawing/2014/main" id="{27A76E6C-02DD-4FDA-9F96-21BD3F4E45B7}"/>
+              </a:ext>
+              <a:ext uri="{C183D7F6-B498-43B3-948B-1728B52AA6E4}">
+                <adec:decorative xmlns:adec="http://schemas.microsoft.com/office/drawing/2017/decorative" val="1"/>
+              </a:ext>
+            </a:extLst>
+          </p:cNvPr>
+          <p:cNvSpPr>
+            <a:spLocks noGrp="1" noRot="1" noChangeAspect="1" noMove="1" noResize="1" noEditPoints="1" noAdjustHandles="1" noChangeArrowheads="1" noChangeShapeType="1" noTextEdit="1"/>
+          </p:cNvSpPr>
+          <p:nvPr>
+            <p:extLst>
+              <p:ext uri="{386F3935-93C4-4BCD-93E2-E3B085C9AB24}">
+                <p16:designElem xmlns:p16="http://schemas.microsoft.com/office/powerpoint/2015/main" val="1"/>
+              </p:ext>
+            </p:extLst>
+          </p:nvPr>
+        </p:nvSpPr>
+        <p:spPr>
+          <a:xfrm>
+            <a:off x="5299341" y="480060"/>
+            <a:ext cx="4661460" cy="5897880"/>
+          </a:xfrm>
+          <a:prstGeom prst="rect">
+            <a:avLst/>
+          </a:prstGeom>
+          <a:solidFill>
+            <a:srgbClr val="FFFFFF"/>
+          </a:solidFill>
+          <a:ln w="22225">
+            <a:solidFill>
+              <a:schemeClr val="tx1">
+                <a:lumMod val="50000"/>
+                <a:lumOff val="50000"/>
+              </a:schemeClr>
+            </a:solidFill>
+          </a:ln>
+        </p:spPr>
+        <p:style>
+          <a:lnRef idx="2">
+            <a:schemeClr val="accent1">
+              <a:shade val="50000"/>
+            </a:schemeClr>
+          </a:lnRef>
+          <a:fillRef idx="1">
+            <a:schemeClr val="accent1"/>
+          </a:fillRef>
+          <a:effectRef idx="0">
+            <a:schemeClr val="accent1"/>
+          </a:effectRef>
+          <a:fontRef idx="minor">
+            <a:schemeClr val="lt1"/>
+          </a:fontRef>
+        </p:style>
+        <p:txBody>
+          <a:bodyPr rtlCol="0" anchor="ctr"/>
+          <a:lstStyle/>
+          <a:p>
+            <a:pPr algn="ctr"/>
+            <a:endParaRPr lang="en-US"/>
+          </a:p>
+        </p:txBody>
+      </p:sp>
+      <p:pic>
+        <p:nvPicPr>
+          <p:cNvPr id="5" name="Picture 4">
+            <a:extLst>
+              <a:ext uri="{FF2B5EF4-FFF2-40B4-BE49-F238E27FC236}">
+                <a16:creationId xmlns:a16="http://schemas.microsoft.com/office/drawing/2014/main" id="{16DA6DCE-28FF-AC46-9D4E-29BE281321C7}"/>
+              </a:ext>
+            </a:extLst>
+          </p:cNvPr>
+          <p:cNvPicPr>
+            <a:picLocks noChangeAspect="1"/>
+          </p:cNvPicPr>
+          <p:nvPr/>
+        </p:nvPicPr>
+        <p:blipFill>
+          <a:blip r:embed="rId4"/>
+          <a:stretch>
+            <a:fillRect/>
+          </a:stretch>
+        </p:blipFill>
+        <p:spPr>
+          <a:xfrm>
+            <a:off x="5464808" y="865764"/>
+            <a:ext cx="4330526" cy="1775516"/>
+          </a:xfrm>
+          <a:prstGeom prst="rect">
+            <a:avLst/>
+          </a:prstGeom>
+        </p:spPr>
+      </p:pic>
+      <p:sp>
+        <p:nvSpPr>
+          <p:cNvPr id="16" name="Rectangle 15">
+            <a:extLst>
+              <a:ext uri="{FF2B5EF4-FFF2-40B4-BE49-F238E27FC236}">
+                <a16:creationId xmlns:a16="http://schemas.microsoft.com/office/drawing/2014/main" id="{D4D9AAD4-B929-4AE3-A27C-651AF2069ED0}"/>
+              </a:ext>
+              <a:ext uri="{C183D7F6-B498-43B3-948B-1728B52AA6E4}">
+                <adec:decorative xmlns:adec="http://schemas.microsoft.com/office/drawing/2017/decorative" val="1"/>
+              </a:ext>
+            </a:extLst>
+          </p:cNvPr>
+          <p:cNvSpPr>
+            <a:spLocks noGrp="1" noRot="1" noChangeAspect="1" noMove="1" noResize="1" noEditPoints="1" noAdjustHandles="1" noChangeArrowheads="1" noChangeShapeType="1" noTextEdit="1"/>
+          </p:cNvSpPr>
+          <p:nvPr>
+            <p:extLst>
+              <p:ext uri="{386F3935-93C4-4BCD-93E2-E3B085C9AB24}">
+                <p16:designElem xmlns:p16="http://schemas.microsoft.com/office/powerpoint/2015/main" val="1"/>
+              </p:ext>
+            </p:extLst>
+          </p:nvPr>
+        </p:nvSpPr>
+        <p:spPr>
+          <a:xfrm>
+            <a:off x="10437812" y="0"/>
+            <a:ext cx="685800" cy="1143000"/>
+          </a:xfrm>
+          <a:prstGeom prst="rect">
+            <a:avLst/>
+          </a:prstGeom>
+          <a:solidFill>
+            <a:schemeClr val="accent1"/>
+          </a:solidFill>
+          <a:ln>
+            <a:noFill/>
+          </a:ln>
+        </p:spPr>
+        <p:style>
+          <a:lnRef idx="1">
+            <a:schemeClr val="accent1"/>
+          </a:lnRef>
+          <a:fillRef idx="3">
+            <a:schemeClr val="accent1"/>
+          </a:fillRef>
+          <a:effectRef idx="2">
+            <a:schemeClr val="accent1"/>
+          </a:effectRef>
+          <a:fontRef idx="minor">
+            <a:schemeClr val="lt1"/>
+          </a:fontRef>
+        </p:style>
+      </p:sp>
+      <p:pic>
+        <p:nvPicPr>
+          <p:cNvPr id="7" name="Picture 6">
+            <a:extLst>
+              <a:ext uri="{FF2B5EF4-FFF2-40B4-BE49-F238E27FC236}">
+                <a16:creationId xmlns:a16="http://schemas.microsoft.com/office/drawing/2014/main" id="{212433B0-630E-3E47-B3FE-D56A24E1552C}"/>
+              </a:ext>
+            </a:extLst>
+          </p:cNvPr>
+          <p:cNvPicPr>
+            <a:picLocks noChangeAspect="1"/>
+          </p:cNvPicPr>
+          <p:nvPr/>
+        </p:nvPicPr>
+        <p:blipFill>
+          <a:blip r:embed="rId5"/>
+          <a:stretch>
+            <a:fillRect/>
+          </a:stretch>
+        </p:blipFill>
+        <p:spPr>
+          <a:xfrm>
+            <a:off x="643001" y="3046438"/>
+            <a:ext cx="4329482" cy="2943194"/>
+          </a:xfrm>
+          <a:prstGeom prst="rect">
+            <a:avLst/>
+          </a:prstGeom>
+        </p:spPr>
+      </p:pic>
+      <p:pic>
+        <p:nvPicPr>
+          <p:cNvPr id="9" name="Picture 8">
+            <a:extLst>
+              <a:ext uri="{FF2B5EF4-FFF2-40B4-BE49-F238E27FC236}">
+                <a16:creationId xmlns:a16="http://schemas.microsoft.com/office/drawing/2014/main" id="{8E5D8F71-0BFD-8B4E-9532-8903ADC89ADE}"/>
+              </a:ext>
+            </a:extLst>
+          </p:cNvPr>
+          <p:cNvPicPr>
+            <a:picLocks noChangeAspect="1"/>
+          </p:cNvPicPr>
+          <p:nvPr/>
+        </p:nvPicPr>
+        <p:blipFill>
+          <a:blip r:embed="rId6"/>
+          <a:stretch>
+            <a:fillRect/>
+          </a:stretch>
+        </p:blipFill>
+        <p:spPr>
+          <a:xfrm>
+            <a:off x="5464808" y="3644206"/>
+            <a:ext cx="4330526" cy="1600682"/>
+          </a:xfrm>
+          <a:prstGeom prst="rect">
+            <a:avLst/>
+          </a:prstGeom>
+        </p:spPr>
+      </p:pic>
+    </p:spTree>
+    <p:extLst>
+      <p:ext uri="{BB962C8B-B14F-4D97-AF65-F5344CB8AC3E}">
+        <p14:creationId xmlns:p14="http://schemas.microsoft.com/office/powerpoint/2010/main" val="769308155"/>
       </p:ext>
     </p:extLst>
   </p:cSld>

</xml_diff>